<commit_message>
final presentation from Shiran
</commit_message>
<xml_diff>
--- a/Sallary gap predictionfrom final.pptx
+++ b/Sallary gap predictionfrom final.pptx
@@ -119,7 +119,7 @@
   </p:defaultTextStyle>
   <p:extLst>
     <p:ext uri="{EFAFB233-063F-42B5-8137-9DF3F51BA10A}">
-      <p15:sldGuideLst xmlns="" xmlns:p15="http://schemas.microsoft.com/office/powerpoint/2012/main">
+      <p15:sldGuideLst xmlns:p15="http://schemas.microsoft.com/office/powerpoint/2012/main">
         <p15:guide id="1" orient="horz" pos="2160">
           <p15:clr>
             <a:srgbClr val="A4A3A4"/>
@@ -2107,6 +2107,13 @@
         </dgm:presLayoutVars>
       </dgm:prSet>
       <dgm:spPr/>
+      <dgm:t>
+        <a:bodyPr/>
+        <a:lstStyle/>
+        <a:p>
+          <a:endParaRPr lang="en-US"/>
+        </a:p>
+      </dgm:t>
     </dgm:pt>
     <dgm:pt modelId="{43729492-7F55-4974-9856-02F7A8B77A46}" type="pres">
       <dgm:prSet presAssocID="{AAEBAAFD-257B-48A4-B1FE-2A7C14C5E515}" presName="composite" presStyleCnt="0"/>
@@ -2121,6 +2128,13 @@
         </dgm:presLayoutVars>
       </dgm:prSet>
       <dgm:spPr/>
+      <dgm:t>
+        <a:bodyPr/>
+        <a:lstStyle/>
+        <a:p>
+          <a:endParaRPr lang="en-US"/>
+        </a:p>
+      </dgm:t>
     </dgm:pt>
     <dgm:pt modelId="{45418856-5B8C-4BC1-A946-1C75CB13470B}" type="pres">
       <dgm:prSet presAssocID="{AAEBAAFD-257B-48A4-B1FE-2A7C14C5E515}" presName="desTx" presStyleLbl="alignAccFollowNode1" presStyleIdx="0" presStyleCnt="3" custScaleX="66210">
@@ -2202,6 +2216,13 @@
         </dgm:presLayoutVars>
       </dgm:prSet>
       <dgm:spPr/>
+      <dgm:t>
+        <a:bodyPr/>
+        <a:lstStyle/>
+        <a:p>
+          <a:endParaRPr lang="en-US"/>
+        </a:p>
+      </dgm:t>
     </dgm:pt>
     <dgm:pt modelId="{84A34885-FE15-4377-A45C-B70B7422E73D}" type="pres">
       <dgm:prSet presAssocID="{3F748F33-D80B-4B79-8DC9-29B2CA036E67}" presName="desTx" presStyleLbl="alignAccFollowNode1" presStyleIdx="2" presStyleCnt="3" custScaleX="70388" custLinFactNeighborX="312" custLinFactNeighborY="809">
@@ -2210,24 +2231,31 @@
         </dgm:presLayoutVars>
       </dgm:prSet>
       <dgm:spPr/>
+      <dgm:t>
+        <a:bodyPr/>
+        <a:lstStyle/>
+        <a:p>
+          <a:endParaRPr lang="en-US"/>
+        </a:p>
+      </dgm:t>
     </dgm:pt>
   </dgm:ptLst>
   <dgm:cxnLst>
-    <dgm:cxn modelId="{9AD68AB1-1CFB-4ED7-8DE7-A1C826C15FFD}" srcId="{6ADED88B-CE03-44F6-A90E-346A361FA214}" destId="{AAEBAAFD-257B-48A4-B1FE-2A7C14C5E515}" srcOrd="0" destOrd="0" parTransId="{F1F65346-0E9B-4F8F-AA7D-CEE7845BC411}" sibTransId="{41C05ACC-10AA-4089-A900-BE3438B85171}"/>
+    <dgm:cxn modelId="{A614B142-C47A-4E4E-97D7-18F359CE228A}" srcId="{6ADED88B-CE03-44F6-A90E-346A361FA214}" destId="{77873B12-5D6B-48FB-A59D-B42447A6EBC5}" srcOrd="1" destOrd="0" parTransId="{B588679D-70DE-4B9E-878E-FFE7BE99D004}" sibTransId="{5F4ADDC9-8629-44A3-A5E5-479A90ACBD9C}"/>
+    <dgm:cxn modelId="{9A5DA506-5428-49DE-B4B5-24150D6B67D7}" srcId="{3F748F33-D80B-4B79-8DC9-29B2CA036E67}" destId="{FC7CA1D8-7D9F-4D0C-9C8D-A362DFD800FF}" srcOrd="0" destOrd="0" parTransId="{BA37CE91-D7BC-45CE-BE9E-0521C3CE4C9A}" sibTransId="{F9CFE3E0-83F0-4510-AFFE-2D7CED447CD3}"/>
+    <dgm:cxn modelId="{3542E855-2042-4112-A58F-8C61AF2BF012}" type="presOf" srcId="{94A9AB30-51EE-4CA4-A868-5D1E8977ED08}" destId="{45418856-5B8C-4BC1-A946-1C75CB13470B}" srcOrd="0" destOrd="1" presId="urn:microsoft.com/office/officeart/2005/8/layout/hList1"/>
+    <dgm:cxn modelId="{6B0D68DB-3E79-47B6-85C5-BE0A2AA1138D}" type="presOf" srcId="{A77522B5-B997-435D-BF75-8B2280DEE119}" destId="{45418856-5B8C-4BC1-A946-1C75CB13470B}" srcOrd="0" destOrd="0" presId="urn:microsoft.com/office/officeart/2005/8/layout/hList1"/>
+    <dgm:cxn modelId="{20628573-EDDA-4641-AA9C-F6E6A47A7587}" type="presOf" srcId="{77873B12-5D6B-48FB-A59D-B42447A6EBC5}" destId="{767A197B-24A8-4950-891C-C9EE6BB4DF29}" srcOrd="0" destOrd="0" presId="urn:microsoft.com/office/officeart/2005/8/layout/hList1"/>
     <dgm:cxn modelId="{B8D6E41B-273B-4A6A-AF90-5E831935C061}" type="presOf" srcId="{AAEBAAFD-257B-48A4-B1FE-2A7C14C5E515}" destId="{11409775-1DE6-407E-A0F8-1A1BFA9C8724}" srcOrd="0" destOrd="0" presId="urn:microsoft.com/office/officeart/2005/8/layout/hList1"/>
     <dgm:cxn modelId="{596B5811-F80E-4D3C-AFBA-AB12C75D6224}" type="presOf" srcId="{6ADED88B-CE03-44F6-A90E-346A361FA214}" destId="{D414A80B-C46D-48DF-84CA-8B5B99EAB705}" srcOrd="0" destOrd="0" presId="urn:microsoft.com/office/officeart/2005/8/layout/hList1"/>
+    <dgm:cxn modelId="{6965EA23-8370-4668-B0DE-4F5978F85BA1}" type="presOf" srcId="{FC7CA1D8-7D9F-4D0C-9C8D-A362DFD800FF}" destId="{84A34885-FE15-4377-A45C-B70B7422E73D}" srcOrd="0" destOrd="0" presId="urn:microsoft.com/office/officeart/2005/8/layout/hList1"/>
+    <dgm:cxn modelId="{A9EE425D-A19C-4497-9370-5D5E48A8BE05}" type="presOf" srcId="{780FA0FF-B545-414D-875B-9AC5673FD996}" destId="{84A34885-FE15-4377-A45C-B70B7422E73D}" srcOrd="0" destOrd="1" presId="urn:microsoft.com/office/officeart/2005/8/layout/hList1"/>
+    <dgm:cxn modelId="{3746ABED-F3ED-464F-93E7-35A6409D4FDB}" srcId="{AAEBAAFD-257B-48A4-B1FE-2A7C14C5E515}" destId="{A77522B5-B997-435D-BF75-8B2280DEE119}" srcOrd="0" destOrd="0" parTransId="{DBDCA326-FF57-4A02-A364-9D256241F5E0}" sibTransId="{3AA9A4F7-9333-483C-B7E5-572154D4E92C}"/>
     <dgm:cxn modelId="{2AE590DA-3177-40C3-A927-BA52BD2A58A5}" srcId="{6ADED88B-CE03-44F6-A90E-346A361FA214}" destId="{3F748F33-D80B-4B79-8DC9-29B2CA036E67}" srcOrd="2" destOrd="0" parTransId="{A8BF67A4-A496-47ED-A438-89F4CF3BD676}" sibTransId="{1FE95B35-05B6-4F1F-BAFB-35F0F36510D4}"/>
-    <dgm:cxn modelId="{9A5DA506-5428-49DE-B4B5-24150D6B67D7}" srcId="{3F748F33-D80B-4B79-8DC9-29B2CA036E67}" destId="{FC7CA1D8-7D9F-4D0C-9C8D-A362DFD800FF}" srcOrd="0" destOrd="0" parTransId="{BA37CE91-D7BC-45CE-BE9E-0521C3CE4C9A}" sibTransId="{F9CFE3E0-83F0-4510-AFFE-2D7CED447CD3}"/>
-    <dgm:cxn modelId="{6965EA23-8370-4668-B0DE-4F5978F85BA1}" type="presOf" srcId="{FC7CA1D8-7D9F-4D0C-9C8D-A362DFD800FF}" destId="{84A34885-FE15-4377-A45C-B70B7422E73D}" srcOrd="0" destOrd="0" presId="urn:microsoft.com/office/officeart/2005/8/layout/hList1"/>
-    <dgm:cxn modelId="{3542E855-2042-4112-A58F-8C61AF2BF012}" type="presOf" srcId="{94A9AB30-51EE-4CA4-A868-5D1E8977ED08}" destId="{45418856-5B8C-4BC1-A946-1C75CB13470B}" srcOrd="0" destOrd="1" presId="urn:microsoft.com/office/officeart/2005/8/layout/hList1"/>
-    <dgm:cxn modelId="{A614B142-C47A-4E4E-97D7-18F359CE228A}" srcId="{6ADED88B-CE03-44F6-A90E-346A361FA214}" destId="{77873B12-5D6B-48FB-A59D-B42447A6EBC5}" srcOrd="1" destOrd="0" parTransId="{B588679D-70DE-4B9E-878E-FFE7BE99D004}" sibTransId="{5F4ADDC9-8629-44A3-A5E5-479A90ACBD9C}"/>
-    <dgm:cxn modelId="{A9EE425D-A19C-4497-9370-5D5E48A8BE05}" type="presOf" srcId="{780FA0FF-B545-414D-875B-9AC5673FD996}" destId="{84A34885-FE15-4377-A45C-B70B7422E73D}" srcOrd="0" destOrd="1" presId="urn:microsoft.com/office/officeart/2005/8/layout/hList1"/>
-    <dgm:cxn modelId="{20628573-EDDA-4641-AA9C-F6E6A47A7587}" type="presOf" srcId="{77873B12-5D6B-48FB-A59D-B42447A6EBC5}" destId="{767A197B-24A8-4950-891C-C9EE6BB4DF29}" srcOrd="0" destOrd="0" presId="urn:microsoft.com/office/officeart/2005/8/layout/hList1"/>
-    <dgm:cxn modelId="{6B0D68DB-3E79-47B6-85C5-BE0A2AA1138D}" type="presOf" srcId="{A77522B5-B997-435D-BF75-8B2280DEE119}" destId="{45418856-5B8C-4BC1-A946-1C75CB13470B}" srcOrd="0" destOrd="0" presId="urn:microsoft.com/office/officeart/2005/8/layout/hList1"/>
-    <dgm:cxn modelId="{E9FFACC5-1445-43B2-9D06-4BFA4C96A12C}" srcId="{AAEBAAFD-257B-48A4-B1FE-2A7C14C5E515}" destId="{94A9AB30-51EE-4CA4-A868-5D1E8977ED08}" srcOrd="1" destOrd="0" parTransId="{6F1B4BC1-A513-4F6B-B2FF-BE9F9000C409}" sibTransId="{1F369402-3CCA-491D-89BA-4173AC0D4812}"/>
     <dgm:cxn modelId="{2C93C71C-F8A1-4EF3-998C-9BABB4A46C55}" srcId="{3F748F33-D80B-4B79-8DC9-29B2CA036E67}" destId="{780FA0FF-B545-414D-875B-9AC5673FD996}" srcOrd="1" destOrd="0" parTransId="{B4999D9F-B269-4195-ADD6-E6A202536EC4}" sibTransId="{2BDA8C00-04B9-4C11-87C3-53E7725BD705}"/>
     <dgm:cxn modelId="{3A7373BC-4F35-4D03-A551-F8303E9C060B}" type="presOf" srcId="{3F748F33-D80B-4B79-8DC9-29B2CA036E67}" destId="{7293FCF8-6EF7-4436-86DD-10BC869183EE}" srcOrd="0" destOrd="0" presId="urn:microsoft.com/office/officeart/2005/8/layout/hList1"/>
-    <dgm:cxn modelId="{3746ABED-F3ED-464F-93E7-35A6409D4FDB}" srcId="{AAEBAAFD-257B-48A4-B1FE-2A7C14C5E515}" destId="{A77522B5-B997-435D-BF75-8B2280DEE119}" srcOrd="0" destOrd="0" parTransId="{DBDCA326-FF57-4A02-A364-9D256241F5E0}" sibTransId="{3AA9A4F7-9333-483C-B7E5-572154D4E92C}"/>
+    <dgm:cxn modelId="{9AD68AB1-1CFB-4ED7-8DE7-A1C826C15FFD}" srcId="{6ADED88B-CE03-44F6-A90E-346A361FA214}" destId="{AAEBAAFD-257B-48A4-B1FE-2A7C14C5E515}" srcOrd="0" destOrd="0" parTransId="{F1F65346-0E9B-4F8F-AA7D-CEE7845BC411}" sibTransId="{41C05ACC-10AA-4089-A900-BE3438B85171}"/>
+    <dgm:cxn modelId="{E9FFACC5-1445-43B2-9D06-4BFA4C96A12C}" srcId="{AAEBAAFD-257B-48A4-B1FE-2A7C14C5E515}" destId="{94A9AB30-51EE-4CA4-A868-5D1E8977ED08}" srcOrd="1" destOrd="0" parTransId="{6F1B4BC1-A513-4F6B-B2FF-BE9F9000C409}" sibTransId="{1F369402-3CCA-491D-89BA-4173AC0D4812}"/>
     <dgm:cxn modelId="{1837DB7F-B2C3-4555-9022-8F0B11ECA1CD}" type="presParOf" srcId="{D414A80B-C46D-48DF-84CA-8B5B99EAB705}" destId="{43729492-7F55-4974-9856-02F7A8B77A46}" srcOrd="0" destOrd="0" presId="urn:microsoft.com/office/officeart/2005/8/layout/hList1"/>
     <dgm:cxn modelId="{100E442F-B514-414D-A8E4-A1E61C6945A9}" type="presParOf" srcId="{43729492-7F55-4974-9856-02F7A8B77A46}" destId="{11409775-1DE6-407E-A0F8-1A1BFA9C8724}" srcOrd="0" destOrd="0" presId="urn:microsoft.com/office/officeart/2005/8/layout/hList1"/>
     <dgm:cxn modelId="{D0950A2E-8DB4-4158-80B4-8ADC118B37C7}" type="presParOf" srcId="{43729492-7F55-4974-9856-02F7A8B77A46}" destId="{45418856-5B8C-4BC1-A946-1C75CB13470B}" srcOrd="1" destOrd="0" presId="urn:microsoft.com/office/officeart/2005/8/layout/hList1"/>
@@ -2244,7 +2272,7 @@
   <dgm:whole/>
   <dgm:extLst>
     <a:ext uri="http://schemas.microsoft.com/office/drawing/2008/diagram">
-      <dsp:dataModelExt xmlns:dsp="http://schemas.microsoft.com/office/drawing/2008/diagram" xmlns="" relId="rId7" minVer="http://schemas.openxmlformats.org/drawingml/2006/diagram"/>
+      <dsp:dataModelExt xmlns:dsp="http://schemas.microsoft.com/office/drawing/2008/diagram" relId="rId7" minVer="http://schemas.openxmlformats.org/drawingml/2006/diagram"/>
     </a:ext>
   </dgm:extLst>
 </dgm:dataModel>
@@ -3001,36 +3029,36 @@
     </dgm:pt>
   </dgm:ptLst>
   <dgm:cxnLst>
+    <dgm:cxn modelId="{49D0FBFE-FBBE-4647-A13A-1D1B6912D866}" type="presOf" srcId="{F2005BE5-81B6-40A9-9D1F-71CD1FD815E2}" destId="{C8E03111-2D96-43BF-AEE9-0B6C973096A1}" srcOrd="0" destOrd="0" presId="urn:microsoft.com/office/officeart/2005/8/layout/bProcess4"/>
+    <dgm:cxn modelId="{32BC61D8-7025-46BD-A385-AB8561059CF3}" type="presOf" srcId="{E393E1D0-1F78-4813-ADB5-0D0FC5AEF02B}" destId="{716196C0-86D2-4CBA-B8E5-AD9B20135694}" srcOrd="0" destOrd="0" presId="urn:microsoft.com/office/officeart/2005/8/layout/bProcess4"/>
+    <dgm:cxn modelId="{AD934956-8E7B-40DB-8155-DA1150BEED51}" type="presOf" srcId="{C2C77EF6-8BC8-4249-99F9-981DBF82F06E}" destId="{CE0FC786-B36E-4E34-9509-1962ADD8D614}" srcOrd="0" destOrd="0" presId="urn:microsoft.com/office/officeart/2005/8/layout/bProcess4"/>
+    <dgm:cxn modelId="{0B8D3AEF-04FE-4549-A094-83DF0DA66161}" srcId="{F5F4E3EA-E94D-4DA9-AAE9-1132AFA87A6A}" destId="{FF87FAED-B62C-4F5A-867D-3862EA3063FA}" srcOrd="6" destOrd="0" parTransId="{67A20901-6564-42AD-AF03-844CCCA74BD0}" sibTransId="{43D2D773-12DB-4AB3-8017-FA0DD336AA9A}"/>
+    <dgm:cxn modelId="{78A8DBE0-4731-4D76-956B-2F6FBE34E028}" type="presOf" srcId="{DD6957EB-D383-46C9-B85D-C0A70BFC4E6E}" destId="{BA9AA43F-6670-452C-BDF7-8463A86E2639}" srcOrd="0" destOrd="0" presId="urn:microsoft.com/office/officeart/2005/8/layout/bProcess4"/>
+    <dgm:cxn modelId="{5FE8F49F-E116-46A3-92A0-97EEE0A84F7A}" srcId="{F5F4E3EA-E94D-4DA9-AAE9-1132AFA87A6A}" destId="{273E4573-2602-4D95-86CF-602B0B9B75CA}" srcOrd="7" destOrd="0" parTransId="{1DF2439C-F2A0-47DF-9FFF-75F3D88A6337}" sibTransId="{E393E1D0-1F78-4813-ADB5-0D0FC5AEF02B}"/>
+    <dgm:cxn modelId="{2ABE4A33-30E7-443E-883F-FAFD88500835}" type="presOf" srcId="{3321D001-DB76-481E-9340-110E2D5B5ACE}" destId="{ED2A6F8B-8811-492D-BF45-587A6DE0E6A8}" srcOrd="0" destOrd="0" presId="urn:microsoft.com/office/officeart/2005/8/layout/bProcess4"/>
+    <dgm:cxn modelId="{47B8A9EA-DE90-4FF2-BCC6-C3F74F734FFC}" type="presOf" srcId="{97B515AE-2926-4F4B-B178-67FE14F5C50E}" destId="{31C7262F-1B23-4D00-AC07-DBFC50BBF115}" srcOrd="0" destOrd="0" presId="urn:microsoft.com/office/officeart/2005/8/layout/bProcess4"/>
+    <dgm:cxn modelId="{64AFB570-050C-4224-8548-E5C18AAF7D35}" type="presOf" srcId="{3EF3531F-83EF-4ECD-A76A-8180D613D4F3}" destId="{28DB4DAD-5303-471B-B399-A8B181A257F2}" srcOrd="0" destOrd="0" presId="urn:microsoft.com/office/officeart/2005/8/layout/bProcess4"/>
+    <dgm:cxn modelId="{B7C29736-64C1-4A3C-910F-42DDC2F02215}" srcId="{F5F4E3EA-E94D-4DA9-AAE9-1132AFA87A6A}" destId="{2440E998-89FA-4EFA-A72D-C66433390683}" srcOrd="0" destOrd="0" parTransId="{FBEB87BC-07B5-4D1E-B68F-CFA13032B0C7}" sibTransId="{CC1205B9-2E23-486A-BEC0-3F5F12DBA8C6}"/>
+    <dgm:cxn modelId="{5E2923D8-FDB8-4983-A0AE-817E6D8DEA10}" type="presOf" srcId="{FF87FAED-B62C-4F5A-867D-3862EA3063FA}" destId="{9B27FF8A-F8E9-4B2A-9BA9-FDA789B76541}" srcOrd="0" destOrd="0" presId="urn:microsoft.com/office/officeart/2005/8/layout/bProcess4"/>
     <dgm:cxn modelId="{D7B67251-0A91-460E-9A11-D1216EAFE487}" srcId="{F5F4E3EA-E94D-4DA9-AAE9-1132AFA87A6A}" destId="{F2005BE5-81B6-40A9-9D1F-71CD1FD815E2}" srcOrd="1" destOrd="0" parTransId="{E6BB0DDF-CC0A-4916-9407-68CB3899C854}" sibTransId="{B5659DF2-7200-4EA0-A527-DC3248B8F1D3}"/>
-    <dgm:cxn modelId="{5FE8F49F-E116-46A3-92A0-97EEE0A84F7A}" srcId="{F5F4E3EA-E94D-4DA9-AAE9-1132AFA87A6A}" destId="{273E4573-2602-4D95-86CF-602B0B9B75CA}" srcOrd="7" destOrd="0" parTransId="{1DF2439C-F2A0-47DF-9FFF-75F3D88A6337}" sibTransId="{E393E1D0-1F78-4813-ADB5-0D0FC5AEF02B}"/>
-    <dgm:cxn modelId="{B7C29736-64C1-4A3C-910F-42DDC2F02215}" srcId="{F5F4E3EA-E94D-4DA9-AAE9-1132AFA87A6A}" destId="{2440E998-89FA-4EFA-A72D-C66433390683}" srcOrd="0" destOrd="0" parTransId="{FBEB87BC-07B5-4D1E-B68F-CFA13032B0C7}" sibTransId="{CC1205B9-2E23-486A-BEC0-3F5F12DBA8C6}"/>
-    <dgm:cxn modelId="{49D0FBFE-FBBE-4647-A13A-1D1B6912D866}" type="presOf" srcId="{F2005BE5-81B6-40A9-9D1F-71CD1FD815E2}" destId="{C8E03111-2D96-43BF-AEE9-0B6C973096A1}" srcOrd="0" destOrd="0" presId="urn:microsoft.com/office/officeart/2005/8/layout/bProcess4"/>
+    <dgm:cxn modelId="{8554BACB-E08D-4FC0-8090-351EC7585488}" type="presOf" srcId="{77495496-FA91-424B-AC28-0A1CE6563580}" destId="{F7383F3F-317D-43C5-88CA-BED49B8C784D}" srcOrd="0" destOrd="0" presId="urn:microsoft.com/office/officeart/2005/8/layout/bProcess4"/>
+    <dgm:cxn modelId="{F7CBADF5-C709-4B1B-8F4C-A83843BD416C}" type="presOf" srcId="{2440E998-89FA-4EFA-A72D-C66433390683}" destId="{D23AD35F-2B05-4B02-9BB3-60F91BFED688}" srcOrd="0" destOrd="0" presId="urn:microsoft.com/office/officeart/2005/8/layout/bProcess4"/>
+    <dgm:cxn modelId="{C25D1441-6B57-4117-B744-366A69079EE1}" type="presOf" srcId="{273E4573-2602-4D95-86CF-602B0B9B75CA}" destId="{3215AD01-AC03-4545-B2CA-61C01DB9E894}" srcOrd="0" destOrd="0" presId="urn:microsoft.com/office/officeart/2005/8/layout/bProcess4"/>
+    <dgm:cxn modelId="{6331F8AD-8063-4264-9125-F11D08960CB0}" type="presOf" srcId="{40078582-36BE-4A5F-BCFE-9473F52E08F1}" destId="{7AA70188-DE8E-46BE-9CE7-B4EF34F4C4B3}" srcOrd="0" destOrd="0" presId="urn:microsoft.com/office/officeart/2005/8/layout/bProcess4"/>
     <dgm:cxn modelId="{FC4948E6-B5EE-4100-A129-ACE4CC47F51D}" srcId="{F5F4E3EA-E94D-4DA9-AAE9-1132AFA87A6A}" destId="{121D37B1-6FF9-4571-862C-816AA053E327}" srcOrd="3" destOrd="0" parTransId="{66E4B04C-ABF9-4EF4-99A0-77CA9B9984AD}" sibTransId="{3EF3531F-83EF-4ECD-A76A-8180D613D4F3}"/>
-    <dgm:cxn modelId="{6331F8AD-8063-4264-9125-F11D08960CB0}" type="presOf" srcId="{40078582-36BE-4A5F-BCFE-9473F52E08F1}" destId="{7AA70188-DE8E-46BE-9CE7-B4EF34F4C4B3}" srcOrd="0" destOrd="0" presId="urn:microsoft.com/office/officeart/2005/8/layout/bProcess4"/>
-    <dgm:cxn modelId="{2ABE4A33-30E7-443E-883F-FAFD88500835}" type="presOf" srcId="{3321D001-DB76-481E-9340-110E2D5B5ACE}" destId="{ED2A6F8B-8811-492D-BF45-587A6DE0E6A8}" srcOrd="0" destOrd="0" presId="urn:microsoft.com/office/officeart/2005/8/layout/bProcess4"/>
-    <dgm:cxn modelId="{C25D1441-6B57-4117-B744-366A69079EE1}" type="presOf" srcId="{273E4573-2602-4D95-86CF-602B0B9B75CA}" destId="{3215AD01-AC03-4545-B2CA-61C01DB9E894}" srcOrd="0" destOrd="0" presId="urn:microsoft.com/office/officeart/2005/8/layout/bProcess4"/>
+    <dgm:cxn modelId="{FADC42CD-5675-42F8-AE3E-535C9F175850}" srcId="{F5F4E3EA-E94D-4DA9-AAE9-1132AFA87A6A}" destId="{97B515AE-2926-4F4B-B178-67FE14F5C50E}" srcOrd="9" destOrd="0" parTransId="{EFA159B2-5492-45C0-B2A0-BC59F60E12C1}" sibTransId="{2ACD7EEF-8BE7-4580-B983-E8FDAEDFAE2A}"/>
+    <dgm:cxn modelId="{28408128-A94C-4A43-A03C-FC67C512BEA9}" type="presOf" srcId="{121D37B1-6FF9-4571-862C-816AA053E327}" destId="{B9F8F33B-827B-4E86-9C18-8072E97D0184}" srcOrd="0" destOrd="0" presId="urn:microsoft.com/office/officeart/2005/8/layout/bProcess4"/>
+    <dgm:cxn modelId="{77B8FBBA-DA28-4872-9B62-5CED4A0376F9}" type="presOf" srcId="{B5659DF2-7200-4EA0-A527-DC3248B8F1D3}" destId="{4B81B544-0D27-4524-B981-04D4FC37E6CB}" srcOrd="0" destOrd="0" presId="urn:microsoft.com/office/officeart/2005/8/layout/bProcess4"/>
+    <dgm:cxn modelId="{3367EEE9-B5A9-4C58-8AC3-A9A550C60AE2}" srcId="{F5F4E3EA-E94D-4DA9-AAE9-1132AFA87A6A}" destId="{DD6957EB-D383-46C9-B85D-C0A70BFC4E6E}" srcOrd="8" destOrd="0" parTransId="{C5B5305F-1B00-458D-93F8-4D068659F99C}" sibTransId="{3321D001-DB76-481E-9340-110E2D5B5ACE}"/>
+    <dgm:cxn modelId="{50C15F47-1E96-4769-8B86-7576FA54946D}" type="presOf" srcId="{43D2D773-12DB-4AB3-8017-FA0DD336AA9A}" destId="{A2031645-D319-4462-B675-8D99AC5AB668}" srcOrd="0" destOrd="0" presId="urn:microsoft.com/office/officeart/2005/8/layout/bProcess4"/>
+    <dgm:cxn modelId="{D122E0F7-0237-45A2-90F1-E647EEC850D4}" type="presOf" srcId="{8413A8B3-D7D4-471D-85E1-39377B25FA03}" destId="{0BBFA2C5-285D-4867-9326-B064D4EDE745}" srcOrd="0" destOrd="0" presId="urn:microsoft.com/office/officeart/2005/8/layout/bProcess4"/>
+    <dgm:cxn modelId="{FEB4DE48-CCFB-4674-8522-F9CBA542BF4B}" srcId="{F5F4E3EA-E94D-4DA9-AAE9-1132AFA87A6A}" destId="{C2C77EF6-8BC8-4249-99F9-981DBF82F06E}" srcOrd="5" destOrd="0" parTransId="{F69F97FE-4DAD-4D2D-94B9-3DE298E11F30}" sibTransId="{40078582-36BE-4A5F-BCFE-9473F52E08F1}"/>
+    <dgm:cxn modelId="{E228EEDD-8223-4AB1-82D2-8B32063A9AF4}" srcId="{F5F4E3EA-E94D-4DA9-AAE9-1132AFA87A6A}" destId="{77495496-FA91-424B-AC28-0A1CE6563580}" srcOrd="2" destOrd="0" parTransId="{15124FF5-04C0-421A-9EC7-501CFC624455}" sibTransId="{8413A8B3-D7D4-471D-85E1-39377B25FA03}"/>
+    <dgm:cxn modelId="{3E5D2C60-1625-4AFE-9B76-F65DB69C5C3D}" type="presOf" srcId="{2AE27A5C-5EBE-4AF8-804F-EA9B06692086}" destId="{D0A0174A-8916-4947-B177-E3E26111BC26}" srcOrd="0" destOrd="0" presId="urn:microsoft.com/office/officeart/2005/8/layout/bProcess4"/>
     <dgm:cxn modelId="{72E4B868-B9B6-4C5E-A13B-8132BD45B98E}" srcId="{F5F4E3EA-E94D-4DA9-AAE9-1132AFA87A6A}" destId="{1F7D449F-9520-4407-B707-5DF9C7B737C5}" srcOrd="4" destOrd="0" parTransId="{39690148-5A71-4843-866D-5C460478A99E}" sibTransId="{2AE27A5C-5EBE-4AF8-804F-EA9B06692086}"/>
     <dgm:cxn modelId="{0C47CC94-E2CF-494E-9BD6-37F7B2757CAD}" type="presOf" srcId="{F5F4E3EA-E94D-4DA9-AAE9-1132AFA87A6A}" destId="{0EA0EAA0-221F-4EC3-8DE4-BAB1C4B3F6A2}" srcOrd="0" destOrd="0" presId="urn:microsoft.com/office/officeart/2005/8/layout/bProcess4"/>
-    <dgm:cxn modelId="{32BC61D8-7025-46BD-A385-AB8561059CF3}" type="presOf" srcId="{E393E1D0-1F78-4813-ADB5-0D0FC5AEF02B}" destId="{716196C0-86D2-4CBA-B8E5-AD9B20135694}" srcOrd="0" destOrd="0" presId="urn:microsoft.com/office/officeart/2005/8/layout/bProcess4"/>
-    <dgm:cxn modelId="{D122E0F7-0237-45A2-90F1-E647EEC850D4}" type="presOf" srcId="{8413A8B3-D7D4-471D-85E1-39377B25FA03}" destId="{0BBFA2C5-285D-4867-9326-B064D4EDE745}" srcOrd="0" destOrd="0" presId="urn:microsoft.com/office/officeart/2005/8/layout/bProcess4"/>
-    <dgm:cxn modelId="{0B8D3AEF-04FE-4549-A094-83DF0DA66161}" srcId="{F5F4E3EA-E94D-4DA9-AAE9-1132AFA87A6A}" destId="{FF87FAED-B62C-4F5A-867D-3862EA3063FA}" srcOrd="6" destOrd="0" parTransId="{67A20901-6564-42AD-AF03-844CCCA74BD0}" sibTransId="{43D2D773-12DB-4AB3-8017-FA0DD336AA9A}"/>
-    <dgm:cxn modelId="{77B8FBBA-DA28-4872-9B62-5CED4A0376F9}" type="presOf" srcId="{B5659DF2-7200-4EA0-A527-DC3248B8F1D3}" destId="{4B81B544-0D27-4524-B981-04D4FC37E6CB}" srcOrd="0" destOrd="0" presId="urn:microsoft.com/office/officeart/2005/8/layout/bProcess4"/>
-    <dgm:cxn modelId="{FADC42CD-5675-42F8-AE3E-535C9F175850}" srcId="{F5F4E3EA-E94D-4DA9-AAE9-1132AFA87A6A}" destId="{97B515AE-2926-4F4B-B178-67FE14F5C50E}" srcOrd="9" destOrd="0" parTransId="{EFA159B2-5492-45C0-B2A0-BC59F60E12C1}" sibTransId="{2ACD7EEF-8BE7-4580-B983-E8FDAEDFAE2A}"/>
-    <dgm:cxn modelId="{50C15F47-1E96-4769-8B86-7576FA54946D}" type="presOf" srcId="{43D2D773-12DB-4AB3-8017-FA0DD336AA9A}" destId="{A2031645-D319-4462-B675-8D99AC5AB668}" srcOrd="0" destOrd="0" presId="urn:microsoft.com/office/officeart/2005/8/layout/bProcess4"/>
-    <dgm:cxn modelId="{F7CBADF5-C709-4B1B-8F4C-A83843BD416C}" type="presOf" srcId="{2440E998-89FA-4EFA-A72D-C66433390683}" destId="{D23AD35F-2B05-4B02-9BB3-60F91BFED688}" srcOrd="0" destOrd="0" presId="urn:microsoft.com/office/officeart/2005/8/layout/bProcess4"/>
-    <dgm:cxn modelId="{8554BACB-E08D-4FC0-8090-351EC7585488}" type="presOf" srcId="{77495496-FA91-424B-AC28-0A1CE6563580}" destId="{F7383F3F-317D-43C5-88CA-BED49B8C784D}" srcOrd="0" destOrd="0" presId="urn:microsoft.com/office/officeart/2005/8/layout/bProcess4"/>
     <dgm:cxn modelId="{84AF6E99-D006-4224-AF5F-E1B7C694D8D4}" type="presOf" srcId="{1F7D449F-9520-4407-B707-5DF9C7B737C5}" destId="{1401E86D-AECD-480A-902E-497FC3F35BCE}" srcOrd="0" destOrd="0" presId="urn:microsoft.com/office/officeart/2005/8/layout/bProcess4"/>
-    <dgm:cxn modelId="{AD934956-8E7B-40DB-8155-DA1150BEED51}" type="presOf" srcId="{C2C77EF6-8BC8-4249-99F9-981DBF82F06E}" destId="{CE0FC786-B36E-4E34-9509-1962ADD8D614}" srcOrd="0" destOrd="0" presId="urn:microsoft.com/office/officeart/2005/8/layout/bProcess4"/>
     <dgm:cxn modelId="{3D590043-4FC7-4D8C-BB5D-8A596D501750}" type="presOf" srcId="{CC1205B9-2E23-486A-BEC0-3F5F12DBA8C6}" destId="{3CF68212-F1C4-4C60-AFDB-F6E0E56308CC}" srcOrd="0" destOrd="0" presId="urn:microsoft.com/office/officeart/2005/8/layout/bProcess4"/>
-    <dgm:cxn modelId="{E228EEDD-8223-4AB1-82D2-8B32063A9AF4}" srcId="{F5F4E3EA-E94D-4DA9-AAE9-1132AFA87A6A}" destId="{77495496-FA91-424B-AC28-0A1CE6563580}" srcOrd="2" destOrd="0" parTransId="{15124FF5-04C0-421A-9EC7-501CFC624455}" sibTransId="{8413A8B3-D7D4-471D-85E1-39377B25FA03}"/>
-    <dgm:cxn modelId="{3E5D2C60-1625-4AFE-9B76-F65DB69C5C3D}" type="presOf" srcId="{2AE27A5C-5EBE-4AF8-804F-EA9B06692086}" destId="{D0A0174A-8916-4947-B177-E3E26111BC26}" srcOrd="0" destOrd="0" presId="urn:microsoft.com/office/officeart/2005/8/layout/bProcess4"/>
-    <dgm:cxn modelId="{3367EEE9-B5A9-4C58-8AC3-A9A550C60AE2}" srcId="{F5F4E3EA-E94D-4DA9-AAE9-1132AFA87A6A}" destId="{DD6957EB-D383-46C9-B85D-C0A70BFC4E6E}" srcOrd="8" destOrd="0" parTransId="{C5B5305F-1B00-458D-93F8-4D068659F99C}" sibTransId="{3321D001-DB76-481E-9340-110E2D5B5ACE}"/>
-    <dgm:cxn modelId="{FEB4DE48-CCFB-4674-8522-F9CBA542BF4B}" srcId="{F5F4E3EA-E94D-4DA9-AAE9-1132AFA87A6A}" destId="{C2C77EF6-8BC8-4249-99F9-981DBF82F06E}" srcOrd="5" destOrd="0" parTransId="{F69F97FE-4DAD-4D2D-94B9-3DE298E11F30}" sibTransId="{40078582-36BE-4A5F-BCFE-9473F52E08F1}"/>
-    <dgm:cxn modelId="{47B8A9EA-DE90-4FF2-BCC6-C3F74F734FFC}" type="presOf" srcId="{97B515AE-2926-4F4B-B178-67FE14F5C50E}" destId="{31C7262F-1B23-4D00-AC07-DBFC50BBF115}" srcOrd="0" destOrd="0" presId="urn:microsoft.com/office/officeart/2005/8/layout/bProcess4"/>
-    <dgm:cxn modelId="{5E2923D8-FDB8-4983-A0AE-817E6D8DEA10}" type="presOf" srcId="{FF87FAED-B62C-4F5A-867D-3862EA3063FA}" destId="{9B27FF8A-F8E9-4B2A-9BA9-FDA789B76541}" srcOrd="0" destOrd="0" presId="urn:microsoft.com/office/officeart/2005/8/layout/bProcess4"/>
-    <dgm:cxn modelId="{28408128-A94C-4A43-A03C-FC67C512BEA9}" type="presOf" srcId="{121D37B1-6FF9-4571-862C-816AA053E327}" destId="{B9F8F33B-827B-4E86-9C18-8072E97D0184}" srcOrd="0" destOrd="0" presId="urn:microsoft.com/office/officeart/2005/8/layout/bProcess4"/>
-    <dgm:cxn modelId="{64AFB570-050C-4224-8548-E5C18AAF7D35}" type="presOf" srcId="{3EF3531F-83EF-4ECD-A76A-8180D613D4F3}" destId="{28DB4DAD-5303-471B-B399-A8B181A257F2}" srcOrd="0" destOrd="0" presId="urn:microsoft.com/office/officeart/2005/8/layout/bProcess4"/>
-    <dgm:cxn modelId="{78A8DBE0-4731-4D76-956B-2F6FBE34E028}" type="presOf" srcId="{DD6957EB-D383-46C9-B85D-C0A70BFC4E6E}" destId="{BA9AA43F-6670-452C-BDF7-8463A86E2639}" srcOrd="0" destOrd="0" presId="urn:microsoft.com/office/officeart/2005/8/layout/bProcess4"/>
     <dgm:cxn modelId="{D67B2B2B-6BB4-4507-81FD-1150470E2622}" type="presParOf" srcId="{0EA0EAA0-221F-4EC3-8DE4-BAB1C4B3F6A2}" destId="{A17DE1C6-6E49-408A-9736-7EF4FBC31435}" srcOrd="0" destOrd="0" presId="urn:microsoft.com/office/officeart/2005/8/layout/bProcess4"/>
     <dgm:cxn modelId="{7E36F69B-246E-4FCA-914A-BE465844ADB9}" type="presParOf" srcId="{A17DE1C6-6E49-408A-9736-7EF4FBC31435}" destId="{BA911427-1561-418F-85C1-41C32BDA9EDC}" srcOrd="0" destOrd="0" presId="urn:microsoft.com/office/officeart/2005/8/layout/bProcess4"/>
     <dgm:cxn modelId="{605CE9B2-876C-4E22-B10F-647CB24D390B}" type="presParOf" srcId="{A17DE1C6-6E49-408A-9736-7EF4FBC31435}" destId="{D23AD35F-2B05-4B02-9BB3-60F91BFED688}" srcOrd="1" destOrd="0" presId="urn:microsoft.com/office/officeart/2005/8/layout/bProcess4"/>
@@ -3075,14 +3103,14 @@
   <dgm:whole/>
   <dgm:extLst>
     <a:ext uri="http://schemas.microsoft.com/office/drawing/2008/diagram">
-      <dsp:dataModelExt xmlns:dsp="http://schemas.microsoft.com/office/drawing/2008/diagram" xmlns="" relId="rId6" minVer="http://schemas.openxmlformats.org/drawingml/2006/diagram"/>
+      <dsp:dataModelExt xmlns:dsp="http://schemas.microsoft.com/office/drawing/2008/diagram" relId="rId6" minVer="http://schemas.openxmlformats.org/drawingml/2006/diagram"/>
     </a:ext>
   </dgm:extLst>
 </dgm:dataModel>
 </file>
 
 <file path=ppt/diagrams/drawing1.xml><?xml version="1.0" encoding="utf-8"?>
-<dsp:drawing xmlns:dgm="http://schemas.openxmlformats.org/drawingml/2006/diagram" xmlns:a="http://schemas.openxmlformats.org/drawingml/2006/main" xmlns:dsp="http://schemas.microsoft.com/office/drawing/2008/diagram">
+<dsp:drawing xmlns:dgm="http://schemas.openxmlformats.org/drawingml/2006/diagram" xmlns:dsp="http://schemas.microsoft.com/office/drawing/2008/diagram" xmlns:a="http://schemas.openxmlformats.org/drawingml/2006/main">
   <dsp:spTree>
     <dsp:nvGrpSpPr>
       <dsp:cNvPr id="0" name=""/>
@@ -3319,7 +3347,7 @@
           <a:endParaRPr lang="he-IL" sz="4500" kern="1200" dirty="0"/>
         </a:p>
       </dsp:txBody>
-      <dsp:txXfrm flipV="1">
+      <dsp:txXfrm rot="10800000">
         <a:off x="4017007" y="1760497"/>
         <a:ext cx="3512415" cy="51543"/>
       </dsp:txXfrm>
@@ -3538,7 +3566,7 @@
 </file>
 
 <file path=ppt/diagrams/drawing2.xml><?xml version="1.0" encoding="utf-8"?>
-<dsp:drawing xmlns:dgm="http://schemas.openxmlformats.org/drawingml/2006/diagram" xmlns:a="http://schemas.openxmlformats.org/drawingml/2006/main" xmlns:dsp="http://schemas.microsoft.com/office/drawing/2008/diagram">
+<dsp:drawing xmlns:dgm="http://schemas.openxmlformats.org/drawingml/2006/diagram" xmlns:dsp="http://schemas.microsoft.com/office/drawing/2008/diagram" xmlns:a="http://schemas.openxmlformats.org/drawingml/2006/main">
   <dsp:spTree>
     <dsp:nvGrpSpPr>
       <dsp:cNvPr id="0" name=""/>
@@ -3661,8 +3689,8 @@
         </a:p>
       </dsp:txBody>
       <dsp:txXfrm>
-        <a:off x="1192940" y="512"/>
-        <a:ext cx="2089440" cy="1253664"/>
+        <a:off x="1229659" y="37231"/>
+        <a:ext cx="2016002" cy="1180226"/>
       </dsp:txXfrm>
     </dsp:sp>
     <dsp:sp modelId="{4B81B544-0D27-4524-B981-04D4FC37E6CB}">
@@ -3781,8 +3809,8 @@
         </a:p>
       </dsp:txBody>
       <dsp:txXfrm>
-        <a:off x="1192940" y="1567593"/>
-        <a:ext cx="2089440" cy="1253664"/>
+        <a:off x="1229659" y="1604312"/>
+        <a:ext cx="2016002" cy="1180226"/>
       </dsp:txXfrm>
     </dsp:sp>
     <dsp:sp modelId="{0BBFA2C5-285D-4867-9326-B064D4EDE745}">
@@ -3901,8 +3929,8 @@
         </a:p>
       </dsp:txBody>
       <dsp:txXfrm>
-        <a:off x="1192940" y="3134673"/>
-        <a:ext cx="2089440" cy="1253664"/>
+        <a:off x="1229659" y="3171392"/>
+        <a:ext cx="2016002" cy="1180226"/>
       </dsp:txXfrm>
     </dsp:sp>
     <dsp:sp modelId="{28DB4DAD-5303-471B-B399-A8B181A257F2}">
@@ -4021,8 +4049,8 @@
         </a:p>
       </dsp:txBody>
       <dsp:txXfrm>
-        <a:off x="1192940" y="4701753"/>
-        <a:ext cx="2089440" cy="1253664"/>
+        <a:off x="1229659" y="4738472"/>
+        <a:ext cx="2016002" cy="1180226"/>
       </dsp:txXfrm>
     </dsp:sp>
     <dsp:sp modelId="{D0A0174A-8916-4947-B177-E3E26111BC26}">
@@ -4141,8 +4169,8 @@
         </a:p>
       </dsp:txBody>
       <dsp:txXfrm>
-        <a:off x="3971896" y="4701753"/>
-        <a:ext cx="2089440" cy="1253664"/>
+        <a:off x="4008615" y="4738472"/>
+        <a:ext cx="2016002" cy="1180226"/>
       </dsp:txXfrm>
     </dsp:sp>
     <dsp:sp modelId="{7AA70188-DE8E-46BE-9CE7-B4EF34F4C4B3}">
@@ -4261,8 +4289,8 @@
         </a:p>
       </dsp:txBody>
       <dsp:txXfrm>
-        <a:off x="3971896" y="3134673"/>
-        <a:ext cx="2089440" cy="1253664"/>
+        <a:off x="4008615" y="3171392"/>
+        <a:ext cx="2016002" cy="1180226"/>
       </dsp:txXfrm>
     </dsp:sp>
     <dsp:sp modelId="{A2031645-D319-4462-B675-8D99AC5AB668}">
@@ -4381,8 +4409,8 @@
         </a:p>
       </dsp:txBody>
       <dsp:txXfrm>
-        <a:off x="3971896" y="1567593"/>
-        <a:ext cx="2089440" cy="1253664"/>
+        <a:off x="4008615" y="1604312"/>
+        <a:ext cx="2016002" cy="1180226"/>
       </dsp:txXfrm>
     </dsp:sp>
     <dsp:sp modelId="{716196C0-86D2-4CBA-B8E5-AD9B20135694}">
@@ -4501,8 +4529,8 @@
         </a:p>
       </dsp:txBody>
       <dsp:txXfrm>
-        <a:off x="3971896" y="512"/>
-        <a:ext cx="2089440" cy="1253664"/>
+        <a:off x="4008615" y="37231"/>
+        <a:ext cx="2016002" cy="1180226"/>
       </dsp:txXfrm>
     </dsp:sp>
     <dsp:sp modelId="{ED2A6F8B-8811-492D-BF45-587A6DE0E6A8}">
@@ -4621,8 +4649,8 @@
         </a:p>
       </dsp:txBody>
       <dsp:txXfrm>
-        <a:off x="6750852" y="512"/>
-        <a:ext cx="2089440" cy="1253664"/>
+        <a:off x="6787571" y="37231"/>
+        <a:ext cx="2016002" cy="1180226"/>
       </dsp:txXfrm>
     </dsp:sp>
     <dsp:sp modelId="{31C7262F-1B23-4D00-AC07-DBFC50BBF115}">
@@ -4700,8 +4728,8 @@
         </a:p>
       </dsp:txBody>
       <dsp:txXfrm>
-        <a:off x="6750852" y="1567593"/>
-        <a:ext cx="2089440" cy="1253664"/>
+        <a:off x="6787571" y="1604312"/>
+        <a:ext cx="2016002" cy="1180226"/>
       </dsp:txXfrm>
     </dsp:sp>
   </dsp:spTree>
@@ -7688,7 +7716,7 @@
             <a:fld id="{DCCFA427-BB50-4F8D-8FC4-B0EA0BA5795C}" type="datetimeFigureOut">
               <a:rPr lang="en-US" smtClean="0"/>
               <a:pPr/>
-              <a:t>1/20/2017</a:t>
+              <a:t>1/22/2017</a:t>
             </a:fld>
             <a:endParaRPr lang="en-US"/>
           </a:p>
@@ -7772,7 +7800,7 @@
     </p:spTree>
     <p:extLst>
       <p:ext uri="{BB962C8B-B14F-4D97-AF65-F5344CB8AC3E}">
-        <p14:creationId xmlns="" xmlns:p14="http://schemas.microsoft.com/office/powerpoint/2010/main" val="254611623"/>
+        <p14:creationId xmlns:p14="http://schemas.microsoft.com/office/powerpoint/2010/main" val="254611623"/>
       </p:ext>
     </p:extLst>
   </p:cSld>
@@ -7892,7 +7920,7 @@
             <a:fld id="{DCCFA427-BB50-4F8D-8FC4-B0EA0BA5795C}" type="datetimeFigureOut">
               <a:rPr lang="en-US" smtClean="0"/>
               <a:pPr/>
-              <a:t>1/20/2017</a:t>
+              <a:t>1/22/2017</a:t>
             </a:fld>
             <a:endParaRPr lang="en-US"/>
           </a:p>
@@ -7944,7 +7972,7 @@
     </p:spTree>
     <p:extLst>
       <p:ext uri="{BB962C8B-B14F-4D97-AF65-F5344CB8AC3E}">
-        <p14:creationId xmlns="" xmlns:p14="http://schemas.microsoft.com/office/powerpoint/2010/main" val="2716736531"/>
+        <p14:creationId xmlns:p14="http://schemas.microsoft.com/office/powerpoint/2010/main" val="2716736531"/>
       </p:ext>
     </p:extLst>
   </p:cSld>
@@ -8074,7 +8102,7 @@
             <a:fld id="{DCCFA427-BB50-4F8D-8FC4-B0EA0BA5795C}" type="datetimeFigureOut">
               <a:rPr lang="en-US" smtClean="0"/>
               <a:pPr/>
-              <a:t>1/20/2017</a:t>
+              <a:t>1/22/2017</a:t>
             </a:fld>
             <a:endParaRPr lang="en-US"/>
           </a:p>
@@ -8126,7 +8154,7 @@
     </p:spTree>
     <p:extLst>
       <p:ext uri="{BB962C8B-B14F-4D97-AF65-F5344CB8AC3E}">
-        <p14:creationId xmlns="" xmlns:p14="http://schemas.microsoft.com/office/powerpoint/2010/main" val="2604561829"/>
+        <p14:creationId xmlns:p14="http://schemas.microsoft.com/office/powerpoint/2010/main" val="2604561829"/>
       </p:ext>
     </p:extLst>
   </p:cSld>
@@ -8246,7 +8274,7 @@
             <a:fld id="{DCCFA427-BB50-4F8D-8FC4-B0EA0BA5795C}" type="datetimeFigureOut">
               <a:rPr lang="en-US" smtClean="0"/>
               <a:pPr/>
-              <a:t>1/20/2017</a:t>
+              <a:t>1/22/2017</a:t>
             </a:fld>
             <a:endParaRPr lang="en-US"/>
           </a:p>
@@ -8298,7 +8326,7 @@
     </p:spTree>
     <p:extLst>
       <p:ext uri="{BB962C8B-B14F-4D97-AF65-F5344CB8AC3E}">
-        <p14:creationId xmlns="" xmlns:p14="http://schemas.microsoft.com/office/powerpoint/2010/main" val="2263785529"/>
+        <p14:creationId xmlns:p14="http://schemas.microsoft.com/office/powerpoint/2010/main" val="2263785529"/>
       </p:ext>
     </p:extLst>
   </p:cSld>
@@ -8819,7 +8847,7 @@
             <a:fld id="{DCCFA427-BB50-4F8D-8FC4-B0EA0BA5795C}" type="datetimeFigureOut">
               <a:rPr lang="en-US" smtClean="0"/>
               <a:pPr/>
-              <a:t>1/20/2017</a:t>
+              <a:t>1/22/2017</a:t>
             </a:fld>
             <a:endParaRPr lang="en-US"/>
           </a:p>
@@ -8885,7 +8913,7 @@
     </p:spTree>
     <p:extLst>
       <p:ext uri="{BB962C8B-B14F-4D97-AF65-F5344CB8AC3E}">
-        <p14:creationId xmlns="" xmlns:p14="http://schemas.microsoft.com/office/powerpoint/2010/main" val="1591096940"/>
+        <p14:creationId xmlns:p14="http://schemas.microsoft.com/office/powerpoint/2010/main" val="1591096940"/>
       </p:ext>
     </p:extLst>
   </p:cSld>
@@ -9123,7 +9151,7 @@
             <a:fld id="{DCCFA427-BB50-4F8D-8FC4-B0EA0BA5795C}" type="datetimeFigureOut">
               <a:rPr lang="en-US" smtClean="0"/>
               <a:pPr/>
-              <a:t>1/20/2017</a:t>
+              <a:t>1/22/2017</a:t>
             </a:fld>
             <a:endParaRPr lang="en-US"/>
           </a:p>
@@ -9175,7 +9203,7 @@
     </p:spTree>
     <p:extLst>
       <p:ext uri="{BB962C8B-B14F-4D97-AF65-F5344CB8AC3E}">
-        <p14:creationId xmlns="" xmlns:p14="http://schemas.microsoft.com/office/powerpoint/2010/main" val="4104223766"/>
+        <p14:creationId xmlns:p14="http://schemas.microsoft.com/office/powerpoint/2010/main" val="4104223766"/>
       </p:ext>
     </p:extLst>
   </p:cSld>
@@ -9562,7 +9590,7 @@
             <a:fld id="{DCCFA427-BB50-4F8D-8FC4-B0EA0BA5795C}" type="datetimeFigureOut">
               <a:rPr lang="en-US" smtClean="0"/>
               <a:pPr/>
-              <a:t>1/20/2017</a:t>
+              <a:t>1/22/2017</a:t>
             </a:fld>
             <a:endParaRPr lang="en-US"/>
           </a:p>
@@ -9614,7 +9642,7 @@
     </p:spTree>
     <p:extLst>
       <p:ext uri="{BB962C8B-B14F-4D97-AF65-F5344CB8AC3E}">
-        <p14:creationId xmlns="" xmlns:p14="http://schemas.microsoft.com/office/powerpoint/2010/main" val="2670169739"/>
+        <p14:creationId xmlns:p14="http://schemas.microsoft.com/office/powerpoint/2010/main" val="2670169739"/>
       </p:ext>
     </p:extLst>
   </p:cSld>
@@ -9682,7 +9710,7 @@
             <a:fld id="{DCCFA427-BB50-4F8D-8FC4-B0EA0BA5795C}" type="datetimeFigureOut">
               <a:rPr lang="en-US" smtClean="0"/>
               <a:pPr/>
-              <a:t>1/20/2017</a:t>
+              <a:t>1/22/2017</a:t>
             </a:fld>
             <a:endParaRPr lang="en-US"/>
           </a:p>
@@ -9734,7 +9762,7 @@
     </p:spTree>
     <p:extLst>
       <p:ext uri="{BB962C8B-B14F-4D97-AF65-F5344CB8AC3E}">
-        <p14:creationId xmlns="" xmlns:p14="http://schemas.microsoft.com/office/powerpoint/2010/main" val="1477665264"/>
+        <p14:creationId xmlns:p14="http://schemas.microsoft.com/office/powerpoint/2010/main" val="1477665264"/>
       </p:ext>
     </p:extLst>
   </p:cSld>
@@ -9779,7 +9807,7 @@
             <a:fld id="{DCCFA427-BB50-4F8D-8FC4-B0EA0BA5795C}" type="datetimeFigureOut">
               <a:rPr lang="en-US" smtClean="0"/>
               <a:pPr/>
-              <a:t>1/20/2017</a:t>
+              <a:t>1/22/2017</a:t>
             </a:fld>
             <a:endParaRPr lang="en-US"/>
           </a:p>
@@ -9831,7 +9859,7 @@
     </p:spTree>
     <p:extLst>
       <p:ext uri="{BB962C8B-B14F-4D97-AF65-F5344CB8AC3E}">
-        <p14:creationId xmlns="" xmlns:p14="http://schemas.microsoft.com/office/powerpoint/2010/main" val="2711781868"/>
+        <p14:creationId xmlns:p14="http://schemas.microsoft.com/office/powerpoint/2010/main" val="2711781868"/>
       </p:ext>
     </p:extLst>
   </p:cSld>
@@ -10163,7 +10191,7 @@
             <a:fld id="{DCCFA427-BB50-4F8D-8FC4-B0EA0BA5795C}" type="datetimeFigureOut">
               <a:rPr lang="en-US" smtClean="0"/>
               <a:pPr/>
-              <a:t>1/20/2017</a:t>
+              <a:t>1/22/2017</a:t>
             </a:fld>
             <a:endParaRPr lang="en-US"/>
           </a:p>
@@ -10271,7 +10299,7 @@
     </p:spTree>
     <p:extLst>
       <p:ext uri="{BB962C8B-B14F-4D97-AF65-F5344CB8AC3E}">
-        <p14:creationId xmlns="" xmlns:p14="http://schemas.microsoft.com/office/powerpoint/2010/main" val="1977218180"/>
+        <p14:creationId xmlns:p14="http://schemas.microsoft.com/office/powerpoint/2010/main" val="1977218180"/>
       </p:ext>
     </p:extLst>
   </p:cSld>
@@ -10559,7 +10587,7 @@
             <a:fld id="{DCCFA427-BB50-4F8D-8FC4-B0EA0BA5795C}" type="datetimeFigureOut">
               <a:rPr lang="en-US" smtClean="0"/>
               <a:pPr/>
-              <a:t>1/20/2017</a:t>
+              <a:t>1/22/2017</a:t>
             </a:fld>
             <a:endParaRPr lang="en-US"/>
           </a:p>
@@ -10681,7 +10709,7 @@
     </p:spTree>
     <p:extLst>
       <p:ext uri="{BB962C8B-B14F-4D97-AF65-F5344CB8AC3E}">
-        <p14:creationId xmlns="" xmlns:p14="http://schemas.microsoft.com/office/powerpoint/2010/main" val="2602728310"/>
+        <p14:creationId xmlns:p14="http://schemas.microsoft.com/office/powerpoint/2010/main" val="2602728310"/>
       </p:ext>
     </p:extLst>
   </p:cSld>
@@ -10874,7 +10902,7 @@
             <a:fld id="{DCCFA427-BB50-4F8D-8FC4-B0EA0BA5795C}" type="datetimeFigureOut">
               <a:rPr lang="en-US" smtClean="0"/>
               <a:pPr/>
-              <a:t>1/20/2017</a:t>
+              <a:t>1/22/2017</a:t>
             </a:fld>
             <a:endParaRPr lang="en-US"/>
           </a:p>
@@ -10964,7 +10992,7 @@
     </p:spTree>
     <p:extLst>
       <p:ext uri="{BB962C8B-B14F-4D97-AF65-F5344CB8AC3E}">
-        <p14:creationId xmlns="" xmlns:p14="http://schemas.microsoft.com/office/powerpoint/2010/main" val="4097071133"/>
+        <p14:creationId xmlns:p14="http://schemas.microsoft.com/office/powerpoint/2010/main" val="4097071133"/>
       </p:ext>
     </p:extLst>
   </p:cSld>
@@ -11449,7 +11477,7 @@
     </p:spTree>
     <p:extLst>
       <p:ext uri="{BB962C8B-B14F-4D97-AF65-F5344CB8AC3E}">
-        <p14:creationId xmlns="" xmlns:p14="http://schemas.microsoft.com/office/powerpoint/2010/main" val="3364559204"/>
+        <p14:creationId xmlns:p14="http://schemas.microsoft.com/office/powerpoint/2010/main" val="3364559204"/>
       </p:ext>
     </p:extLst>
   </p:cSld>
@@ -11620,6 +11648,13 @@
   <p:clrMapOvr>
     <a:masterClrMapping/>
   </p:clrMapOvr>
+  <p:timing>
+    <p:tnLst>
+      <p:par>
+        <p:cTn id="1" dur="indefinite" restart="never" nodeType="tmRoot"/>
+      </p:par>
+    </p:tnLst>
+  </p:timing>
 </p:sld>
 </file>
 
@@ -11724,7 +11759,6 @@
               <a:rPr lang="en-US" dirty="0" smtClean="0"/>
               <a:t>Results:</a:t>
             </a:r>
-            <a:endParaRPr lang="en-US" dirty="0" smtClean="0"/>
           </a:p>
           <a:p>
             <a:endParaRPr lang="en-US" dirty="0" smtClean="0"/>
@@ -11937,7 +11971,7 @@
     </p:spTree>
     <p:extLst>
       <p:ext uri="{BB962C8B-B14F-4D97-AF65-F5344CB8AC3E}">
-        <p14:creationId xmlns="" xmlns:p14="http://schemas.microsoft.com/office/powerpoint/2010/main" val="2150587283"/>
+        <p14:creationId xmlns:p14="http://schemas.microsoft.com/office/powerpoint/2010/main" val="2150587283"/>
       </p:ext>
     </p:extLst>
   </p:cSld>
@@ -11980,7 +12014,7 @@
                                         <p:tgtEl>
                                           <p:spTgt spid="3">
                                             <p:txEl>
-                                              <p:pRg st="1" end="1"/>
+                                              <p:pRg st="0" end="0"/>
                                             </p:txEl>
                                           </p:spTgt>
                                         </p:tgtEl>
@@ -11998,7 +12032,7 @@
                                         <p:tgtEl>
                                           <p:spTgt spid="3">
                                             <p:txEl>
-                                              <p:pRg st="1" end="1"/>
+                                              <p:pRg st="0" end="0"/>
                                             </p:txEl>
                                           </p:spTgt>
                                         </p:tgtEl>
@@ -12041,7 +12075,7 @@
                                         <p:tgtEl>
                                           <p:spTgt spid="3">
                                             <p:txEl>
-                                              <p:pRg st="2" end="2"/>
+                                              <p:pRg st="1" end="1"/>
                                             </p:txEl>
                                           </p:spTgt>
                                         </p:tgtEl>
@@ -12059,7 +12093,7 @@
                                         <p:tgtEl>
                                           <p:spTgt spid="3">
                                             <p:txEl>
-                                              <p:pRg st="2" end="2"/>
+                                              <p:pRg st="1" end="1"/>
                                             </p:txEl>
                                           </p:spTgt>
                                         </p:tgtEl>
@@ -12102,7 +12136,7 @@
                                         <p:tgtEl>
                                           <p:spTgt spid="3">
                                             <p:txEl>
-                                              <p:pRg st="3" end="3"/>
+                                              <p:pRg st="2" end="2"/>
                                             </p:txEl>
                                           </p:spTgt>
                                         </p:tgtEl>
@@ -12120,7 +12154,7 @@
                                         <p:tgtEl>
                                           <p:spTgt spid="3">
                                             <p:txEl>
-                                              <p:pRg st="3" end="3"/>
+                                              <p:pRg st="2" end="2"/>
                                             </p:txEl>
                                           </p:spTgt>
                                         </p:tgtEl>
@@ -12163,7 +12197,7 @@
                                         <p:tgtEl>
                                           <p:spTgt spid="3">
                                             <p:txEl>
-                                              <p:pRg st="4" end="4"/>
+                                              <p:pRg st="3" end="3"/>
                                             </p:txEl>
                                           </p:spTgt>
                                         </p:tgtEl>
@@ -12181,7 +12215,7 @@
                                         <p:tgtEl>
                                           <p:spTgt spid="3">
                                             <p:txEl>
-                                              <p:pRg st="4" end="4"/>
+                                              <p:pRg st="3" end="3"/>
                                             </p:txEl>
                                           </p:spTgt>
                                         </p:tgtEl>
@@ -12224,7 +12258,7 @@
                                         <p:tgtEl>
                                           <p:spTgt spid="3">
                                             <p:txEl>
-                                              <p:pRg st="0" end="0"/>
+                                              <p:pRg st="4" end="4"/>
                                             </p:txEl>
                                           </p:spTgt>
                                         </p:tgtEl>
@@ -12242,7 +12276,7 @@
                                         <p:tgtEl>
                                           <p:spTgt spid="3">
                                             <p:txEl>
-                                              <p:pRg st="0" end="0"/>
+                                              <p:pRg st="4" end="4"/>
                                             </p:txEl>
                                           </p:spTgt>
                                         </p:tgtEl>
@@ -12288,6 +12322,59 @@
                                               <p:pRg st="5" end="5"/>
                                             </p:txEl>
                                           </p:spTgt>
+                                        </p:tgtEl>
+                                      </p:cBhvr>
+                                    </p:animEffect>
+                                  </p:childTnLst>
+                                </p:cTn>
+                              </p:par>
+                            </p:childTnLst>
+                          </p:cTn>
+                        </p:par>
+                      </p:childTnLst>
+                    </p:cTn>
+                  </p:par>
+                  <p:par>
+                    <p:cTn id="31" fill="hold">
+                      <p:stCondLst>
+                        <p:cond delay="indefinite"/>
+                      </p:stCondLst>
+                      <p:childTnLst>
+                        <p:par>
+                          <p:cTn id="32" fill="hold">
+                            <p:stCondLst>
+                              <p:cond delay="0"/>
+                            </p:stCondLst>
+                            <p:childTnLst>
+                              <p:par>
+                                <p:cTn id="33" presetID="6" presetClass="entr" presetSubtype="16" fill="hold" nodeType="clickEffect">
+                                  <p:stCondLst>
+                                    <p:cond delay="0"/>
+                                  </p:stCondLst>
+                                  <p:childTnLst>
+                                    <p:set>
+                                      <p:cBhvr>
+                                        <p:cTn id="34" dur="1" fill="hold">
+                                          <p:stCondLst>
+                                            <p:cond delay="0"/>
+                                          </p:stCondLst>
+                                        </p:cTn>
+                                        <p:tgtEl>
+                                          <p:spTgt spid="5"/>
+                                        </p:tgtEl>
+                                        <p:attrNameLst>
+                                          <p:attrName>style.visibility</p:attrName>
+                                        </p:attrNameLst>
+                                      </p:cBhvr>
+                                      <p:to>
+                                        <p:strVal val="visible"/>
+                                      </p:to>
+                                    </p:set>
+                                    <p:animEffect transition="in" filter="circle(in)">
+                                      <p:cBhvr>
+                                        <p:cTn id="35" dur="2000"/>
+                                        <p:tgtEl>
+                                          <p:spTgt spid="5"/>
                                         </p:tgtEl>
                                       </p:cBhvr>
                                     </p:animEffect>
@@ -12352,7 +12439,7 @@
             <p:ph idx="1"/>
             <p:extLst>
               <p:ext uri="{D42A27DB-BD31-4B8C-83A1-F6EECF244321}">
-                <p14:modId xmlns="" xmlns:p14="http://schemas.microsoft.com/office/powerpoint/2010/main" val="3792774229"/>
+                <p14:modId xmlns:p14="http://schemas.microsoft.com/office/powerpoint/2010/main" val="3792774229"/>
               </p:ext>
             </p:extLst>
           </p:nvPr>
@@ -12402,7 +12489,7 @@
     </p:spTree>
     <p:extLst>
       <p:ext uri="{BB962C8B-B14F-4D97-AF65-F5344CB8AC3E}">
-        <p14:creationId xmlns="" xmlns:p14="http://schemas.microsoft.com/office/powerpoint/2010/main" val="3798862902"/>
+        <p14:creationId xmlns:p14="http://schemas.microsoft.com/office/powerpoint/2010/main" val="3798862902"/>
       </p:ext>
     </p:extLst>
   </p:cSld>
@@ -12488,6 +12575,13 @@
   <p:clrMapOvr>
     <a:masterClrMapping/>
   </p:clrMapOvr>
+  <p:timing>
+    <p:tnLst>
+      <p:par>
+        <p:cTn id="1" dur="indefinite" restart="never" nodeType="tmRoot"/>
+      </p:par>
+    </p:tnLst>
+  </p:timing>
 </p:sld>
 </file>
 
@@ -12664,7 +12758,7 @@
     </p:spTree>
     <p:extLst>
       <p:ext uri="{BB962C8B-B14F-4D97-AF65-F5344CB8AC3E}">
-        <p14:creationId xmlns="" xmlns:p14="http://schemas.microsoft.com/office/powerpoint/2010/main" val="809872952"/>
+        <p14:creationId xmlns:p14="http://schemas.microsoft.com/office/powerpoint/2010/main" val="809872952"/>
       </p:ext>
     </p:extLst>
   </p:cSld>
@@ -12781,11 +12875,7 @@
           <a:p>
             <a:r>
               <a:rPr lang="en-US" dirty="0" smtClean="0"/>
-              <a:t>Research </a:t>
-            </a:r>
-            <a:r>
-              <a:rPr lang="en-US" dirty="0" smtClean="0"/>
-              <a:t>article:</a:t>
+              <a:t>Research article:</a:t>
             </a:r>
           </a:p>
           <a:p>
@@ -12843,7 +12933,7 @@
     </p:spTree>
     <p:extLst>
       <p:ext uri="{BB962C8B-B14F-4D97-AF65-F5344CB8AC3E}">
-        <p14:creationId xmlns="" xmlns:p14="http://schemas.microsoft.com/office/powerpoint/2010/main" val="488657827"/>
+        <p14:creationId xmlns:p14="http://schemas.microsoft.com/office/powerpoint/2010/main" val="488657827"/>
       </p:ext>
     </p:extLst>
   </p:cSld>
@@ -13013,7 +13103,7 @@
     </p:spTree>
     <p:extLst>
       <p:ext uri="{BB962C8B-B14F-4D97-AF65-F5344CB8AC3E}">
-        <p14:creationId xmlns="" xmlns:p14="http://schemas.microsoft.com/office/powerpoint/2010/main" val="184644264"/>
+        <p14:creationId xmlns:p14="http://schemas.microsoft.com/office/powerpoint/2010/main" val="184644264"/>
       </p:ext>
     </p:extLst>
   </p:cSld>
@@ -13396,7 +13486,7 @@
     </p:spTree>
     <p:extLst>
       <p:ext uri="{BB962C8B-B14F-4D97-AF65-F5344CB8AC3E}">
-        <p14:creationId xmlns="" xmlns:p14="http://schemas.microsoft.com/office/powerpoint/2010/main" val="3021417476"/>
+        <p14:creationId xmlns:p14="http://schemas.microsoft.com/office/powerpoint/2010/main" val="3021417476"/>
       </p:ext>
     </p:extLst>
   </p:cSld>
@@ -13515,13 +13605,8 @@
             <a:pPr lvl="1"/>
             <a:r>
               <a:rPr lang="en-US" dirty="0" smtClean="0"/>
-              <a:t>Lasso (55, 25 countries</a:t>
-            </a:r>
-            <a:r>
-              <a:rPr lang="en-US" dirty="0" smtClean="0"/>
-              <a:t>) – removed year feature!</a:t>
-            </a:r>
-            <a:endParaRPr lang="en-US" dirty="0" smtClean="0"/>
+              <a:t>Lasso (55, 25 countries) – removed year feature!</a:t>
+            </a:r>
           </a:p>
           <a:p>
             <a:pPr>
@@ -13606,7 +13691,7 @@
     </p:spTree>
     <p:extLst>
       <p:ext uri="{BB962C8B-B14F-4D97-AF65-F5344CB8AC3E}">
-        <p14:creationId xmlns="" xmlns:p14="http://schemas.microsoft.com/office/powerpoint/2010/main" val="2991472870"/>
+        <p14:creationId xmlns:p14="http://schemas.microsoft.com/office/powerpoint/2010/main" val="2991472870"/>
       </p:ext>
     </p:extLst>
   </p:cSld>
@@ -13987,6 +14072,59 @@
                       </p:childTnLst>
                     </p:cTn>
                   </p:par>
+                  <p:par>
+                    <p:cTn id="30" fill="hold">
+                      <p:stCondLst>
+                        <p:cond delay="indefinite"/>
+                      </p:stCondLst>
+                      <p:childTnLst>
+                        <p:par>
+                          <p:cTn id="31" fill="hold">
+                            <p:stCondLst>
+                              <p:cond delay="0"/>
+                            </p:stCondLst>
+                            <p:childTnLst>
+                              <p:par>
+                                <p:cTn id="32" presetID="10" presetClass="entr" presetSubtype="0" fill="hold" nodeType="clickEffect">
+                                  <p:stCondLst>
+                                    <p:cond delay="0"/>
+                                  </p:stCondLst>
+                                  <p:childTnLst>
+                                    <p:set>
+                                      <p:cBhvr>
+                                        <p:cTn id="33" dur="1" fill="hold">
+                                          <p:stCondLst>
+                                            <p:cond delay="0"/>
+                                          </p:stCondLst>
+                                        </p:cTn>
+                                        <p:tgtEl>
+                                          <p:spTgt spid="8"/>
+                                        </p:tgtEl>
+                                        <p:attrNameLst>
+                                          <p:attrName>style.visibility</p:attrName>
+                                        </p:attrNameLst>
+                                      </p:cBhvr>
+                                      <p:to>
+                                        <p:strVal val="visible"/>
+                                      </p:to>
+                                    </p:set>
+                                    <p:animEffect transition="in" filter="fade">
+                                      <p:cBhvr>
+                                        <p:cTn id="34" dur="500"/>
+                                        <p:tgtEl>
+                                          <p:spTgt spid="8"/>
+                                        </p:tgtEl>
+                                      </p:cBhvr>
+                                    </p:animEffect>
+                                  </p:childTnLst>
+                                </p:cTn>
+                              </p:par>
+                            </p:childTnLst>
+                          </p:cTn>
+                        </p:par>
+                      </p:childTnLst>
+                    </p:cTn>
+                  </p:par>
                 </p:childTnLst>
               </p:cTn>
               <p:prevCondLst>
@@ -14086,11 +14224,7 @@
           <a:p>
             <a:r>
               <a:rPr lang="en-US" dirty="0" smtClean="0"/>
-              <a:t>Creating </a:t>
-            </a:r>
-            <a:r>
-              <a:rPr lang="en-US" dirty="0" smtClean="0"/>
-              <a:t>scatter matrix on a group of manually related features with Wage Gap</a:t>
+              <a:t>Creating scatter matrix on a group of manually related features with Wage Gap</a:t>
             </a:r>
           </a:p>
           <a:p>
@@ -14154,7 +14288,7 @@
           <a:blip r:embed="rId2" cstate="print">
             <a:extLst>
               <a:ext uri="{28A0092B-C50C-407E-A947-70E740481C1C}">
-                <a14:useLocalDpi xmlns="" xmlns:a14="http://schemas.microsoft.com/office/drawing/2010/main" val="0"/>
+                <a14:useLocalDpi xmlns:a14="http://schemas.microsoft.com/office/drawing/2010/main" val="0"/>
               </a:ext>
             </a:extLst>
           </a:blip>
@@ -14184,7 +14318,7 @@
           <a:blip r:embed="rId3" cstate="print">
             <a:extLst>
               <a:ext uri="{28A0092B-C50C-407E-A947-70E740481C1C}">
-                <a14:useLocalDpi xmlns="" xmlns:a14="http://schemas.microsoft.com/office/drawing/2010/main" val="0"/>
+                <a14:useLocalDpi xmlns:a14="http://schemas.microsoft.com/office/drawing/2010/main" val="0"/>
               </a:ext>
             </a:extLst>
           </a:blip>
@@ -14229,7 +14363,7 @@
     </p:spTree>
     <p:extLst>
       <p:ext uri="{BB962C8B-B14F-4D97-AF65-F5344CB8AC3E}">
-        <p14:creationId xmlns="" xmlns:p14="http://schemas.microsoft.com/office/powerpoint/2010/main" val="1537339701"/>
+        <p14:creationId xmlns:p14="http://schemas.microsoft.com/office/powerpoint/2010/main" val="1537339701"/>
       </p:ext>
     </p:extLst>
   </p:cSld>
@@ -14375,7 +14509,7 @@
     </p:spTree>
     <p:extLst>
       <p:ext uri="{BB962C8B-B14F-4D97-AF65-F5344CB8AC3E}">
-        <p14:creationId xmlns="" xmlns:p14="http://schemas.microsoft.com/office/powerpoint/2010/main" val="4133172040"/>
+        <p14:creationId xmlns:p14="http://schemas.microsoft.com/office/powerpoint/2010/main" val="4133172040"/>
       </p:ext>
     </p:extLst>
   </p:cSld>
@@ -14550,7 +14684,7 @@
     </p:spTree>
     <p:extLst>
       <p:ext uri="{BB962C8B-B14F-4D97-AF65-F5344CB8AC3E}">
-        <p14:creationId xmlns="" xmlns:p14="http://schemas.microsoft.com/office/powerpoint/2010/main" val="432327544"/>
+        <p14:creationId xmlns:p14="http://schemas.microsoft.com/office/powerpoint/2010/main" val="432327544"/>
       </p:ext>
     </p:extLst>
   </p:cSld>
@@ -14885,7 +15019,7 @@
     </p:spTree>
     <p:extLst>
       <p:ext uri="{BB962C8B-B14F-4D97-AF65-F5344CB8AC3E}">
-        <p14:creationId xmlns="" xmlns:p14="http://schemas.microsoft.com/office/powerpoint/2010/main" val="3204925983"/>
+        <p14:creationId xmlns:p14="http://schemas.microsoft.com/office/powerpoint/2010/main" val="3204925983"/>
       </p:ext>
     </p:extLst>
   </p:cSld>
@@ -15177,7 +15311,7 @@
   <a:extraClrSchemeLst/>
   <a:extLst>
     <a:ext uri="{05A4C25C-085E-4340-85A3-A5531E510DB2}">
-      <thm15:themeFamily xmlns="" xmlns:thm15="http://schemas.microsoft.com/office/thememl/2012/main" name="Savon" id="{1306E473-ED32-493B-A2D0-240A757EDD34}" vid="{C20BADFE-D095-436F-9677-9264042809F0}"/>
+      <thm15:themeFamily xmlns:thm15="http://schemas.microsoft.com/office/thememl/2012/main" name="Savon" id="{1306E473-ED32-493B-A2D0-240A757EDD34}" vid="{C20BADFE-D095-436F-9677-9264042809F0}"/>
     </a:ext>
   </a:extLst>
 </a:theme>

</xml_diff>

<commit_message>
some more little fixes to the final presentation from Banko
</commit_message>
<xml_diff>
--- a/Sallary gap predictionfrom final.pptx
+++ b/Sallary gap predictionfrom final.pptx
@@ -119,7 +119,7 @@
   </p:defaultTextStyle>
   <p:extLst>
     <p:ext uri="{EFAFB233-063F-42B5-8137-9DF3F51BA10A}">
-      <p15:sldGuideLst xmlns:p15="http://schemas.microsoft.com/office/powerpoint/2012/main">
+      <p15:sldGuideLst xmlns:p15="http://schemas.microsoft.com/office/powerpoint/2012/main" xmlns="">
         <p15:guide id="1" orient="horz" pos="2160">
           <p15:clr>
             <a:srgbClr val="A4A3A4"/>
@@ -1867,7 +1867,11 @@
           <a:pPr algn="l" rtl="0"/>
           <a:r>
             <a:rPr lang="en-US" sz="2400" dirty="0" smtClean="0"/>
-            <a:t>reduce gender wage gap among the OECD</a:t>
+            <a:t>Reduce </a:t>
+          </a:r>
+          <a:r>
+            <a:rPr lang="en-US" sz="2400" dirty="0" smtClean="0"/>
+            <a:t>gender wage gap among the OECD</a:t>
           </a:r>
           <a:endParaRPr lang="he-IL" sz="2400" dirty="0"/>
         </a:p>
@@ -1907,7 +1911,11 @@
           <a:pPr algn="l" rtl="0"/>
           <a:r>
             <a:rPr lang="en-US" sz="2400" dirty="0" smtClean="0"/>
-            <a:t>discover non trivial dependencies</a:t>
+            <a:t>Discover </a:t>
+          </a:r>
+          <a:r>
+            <a:rPr lang="en-US" sz="2400" dirty="0" smtClean="0"/>
+            <a:t>non trivial dependencies</a:t>
           </a:r>
           <a:endParaRPr lang="he-IL" sz="2400" dirty="0"/>
         </a:p>
@@ -2027,7 +2035,11 @@
           <a:pPr rtl="0"/>
           <a:r>
             <a:rPr lang="en-US" sz="2400" dirty="0" smtClean="0"/>
-            <a:t>averaging state predictions</a:t>
+            <a:t>Averaging </a:t>
+          </a:r>
+          <a:r>
+            <a:rPr lang="en-US" sz="2400" dirty="0" smtClean="0"/>
+            <a:t>state predictions</a:t>
           </a:r>
           <a:endParaRPr lang="he-IL" sz="2400" dirty="0"/>
         </a:p>
@@ -2241,21 +2253,21 @@
     </dgm:pt>
   </dgm:ptLst>
   <dgm:cxnLst>
+    <dgm:cxn modelId="{9AD68AB1-1CFB-4ED7-8DE7-A1C826C15FFD}" srcId="{6ADED88B-CE03-44F6-A90E-346A361FA214}" destId="{AAEBAAFD-257B-48A4-B1FE-2A7C14C5E515}" srcOrd="0" destOrd="0" parTransId="{F1F65346-0E9B-4F8F-AA7D-CEE7845BC411}" sibTransId="{41C05ACC-10AA-4089-A900-BE3438B85171}"/>
+    <dgm:cxn modelId="{B8D6E41B-273B-4A6A-AF90-5E831935C061}" type="presOf" srcId="{AAEBAAFD-257B-48A4-B1FE-2A7C14C5E515}" destId="{11409775-1DE6-407E-A0F8-1A1BFA9C8724}" srcOrd="0" destOrd="0" presId="urn:microsoft.com/office/officeart/2005/8/layout/hList1"/>
+    <dgm:cxn modelId="{6B0D68DB-3E79-47B6-85C5-BE0A2AA1138D}" type="presOf" srcId="{A77522B5-B997-435D-BF75-8B2280DEE119}" destId="{45418856-5B8C-4BC1-A946-1C75CB13470B}" srcOrd="0" destOrd="0" presId="urn:microsoft.com/office/officeart/2005/8/layout/hList1"/>
+    <dgm:cxn modelId="{6965EA23-8370-4668-B0DE-4F5978F85BA1}" type="presOf" srcId="{FC7CA1D8-7D9F-4D0C-9C8D-A362DFD800FF}" destId="{84A34885-FE15-4377-A45C-B70B7422E73D}" srcOrd="0" destOrd="0" presId="urn:microsoft.com/office/officeart/2005/8/layout/hList1"/>
+    <dgm:cxn modelId="{3542E855-2042-4112-A58F-8C61AF2BF012}" type="presOf" srcId="{94A9AB30-51EE-4CA4-A868-5D1E8977ED08}" destId="{45418856-5B8C-4BC1-A946-1C75CB13470B}" srcOrd="0" destOrd="1" presId="urn:microsoft.com/office/officeart/2005/8/layout/hList1"/>
+    <dgm:cxn modelId="{9A5DA506-5428-49DE-B4B5-24150D6B67D7}" srcId="{3F748F33-D80B-4B79-8DC9-29B2CA036E67}" destId="{FC7CA1D8-7D9F-4D0C-9C8D-A362DFD800FF}" srcOrd="0" destOrd="0" parTransId="{BA37CE91-D7BC-45CE-BE9E-0521C3CE4C9A}" sibTransId="{F9CFE3E0-83F0-4510-AFFE-2D7CED447CD3}"/>
     <dgm:cxn modelId="{A614B142-C47A-4E4E-97D7-18F359CE228A}" srcId="{6ADED88B-CE03-44F6-A90E-346A361FA214}" destId="{77873B12-5D6B-48FB-A59D-B42447A6EBC5}" srcOrd="1" destOrd="0" parTransId="{B588679D-70DE-4B9E-878E-FFE7BE99D004}" sibTransId="{5F4ADDC9-8629-44A3-A5E5-479A90ACBD9C}"/>
-    <dgm:cxn modelId="{9A5DA506-5428-49DE-B4B5-24150D6B67D7}" srcId="{3F748F33-D80B-4B79-8DC9-29B2CA036E67}" destId="{FC7CA1D8-7D9F-4D0C-9C8D-A362DFD800FF}" srcOrd="0" destOrd="0" parTransId="{BA37CE91-D7BC-45CE-BE9E-0521C3CE4C9A}" sibTransId="{F9CFE3E0-83F0-4510-AFFE-2D7CED447CD3}"/>
-    <dgm:cxn modelId="{3542E855-2042-4112-A58F-8C61AF2BF012}" type="presOf" srcId="{94A9AB30-51EE-4CA4-A868-5D1E8977ED08}" destId="{45418856-5B8C-4BC1-A946-1C75CB13470B}" srcOrd="0" destOrd="1" presId="urn:microsoft.com/office/officeart/2005/8/layout/hList1"/>
-    <dgm:cxn modelId="{6B0D68DB-3E79-47B6-85C5-BE0A2AA1138D}" type="presOf" srcId="{A77522B5-B997-435D-BF75-8B2280DEE119}" destId="{45418856-5B8C-4BC1-A946-1C75CB13470B}" srcOrd="0" destOrd="0" presId="urn:microsoft.com/office/officeart/2005/8/layout/hList1"/>
+    <dgm:cxn modelId="{2AE590DA-3177-40C3-A927-BA52BD2A58A5}" srcId="{6ADED88B-CE03-44F6-A90E-346A361FA214}" destId="{3F748F33-D80B-4B79-8DC9-29B2CA036E67}" srcOrd="2" destOrd="0" parTransId="{A8BF67A4-A496-47ED-A438-89F4CF3BD676}" sibTransId="{1FE95B35-05B6-4F1F-BAFB-35F0F36510D4}"/>
+    <dgm:cxn modelId="{596B5811-F80E-4D3C-AFBA-AB12C75D6224}" type="presOf" srcId="{6ADED88B-CE03-44F6-A90E-346A361FA214}" destId="{D414A80B-C46D-48DF-84CA-8B5B99EAB705}" srcOrd="0" destOrd="0" presId="urn:microsoft.com/office/officeart/2005/8/layout/hList1"/>
+    <dgm:cxn modelId="{E9FFACC5-1445-43B2-9D06-4BFA4C96A12C}" srcId="{AAEBAAFD-257B-48A4-B1FE-2A7C14C5E515}" destId="{94A9AB30-51EE-4CA4-A868-5D1E8977ED08}" srcOrd="1" destOrd="0" parTransId="{6F1B4BC1-A513-4F6B-B2FF-BE9F9000C409}" sibTransId="{1F369402-3CCA-491D-89BA-4173AC0D4812}"/>
+    <dgm:cxn modelId="{3746ABED-F3ED-464F-93E7-35A6409D4FDB}" srcId="{AAEBAAFD-257B-48A4-B1FE-2A7C14C5E515}" destId="{A77522B5-B997-435D-BF75-8B2280DEE119}" srcOrd="0" destOrd="0" parTransId="{DBDCA326-FF57-4A02-A364-9D256241F5E0}" sibTransId="{3AA9A4F7-9333-483C-B7E5-572154D4E92C}"/>
     <dgm:cxn modelId="{20628573-EDDA-4641-AA9C-F6E6A47A7587}" type="presOf" srcId="{77873B12-5D6B-48FB-A59D-B42447A6EBC5}" destId="{767A197B-24A8-4950-891C-C9EE6BB4DF29}" srcOrd="0" destOrd="0" presId="urn:microsoft.com/office/officeart/2005/8/layout/hList1"/>
-    <dgm:cxn modelId="{B8D6E41B-273B-4A6A-AF90-5E831935C061}" type="presOf" srcId="{AAEBAAFD-257B-48A4-B1FE-2A7C14C5E515}" destId="{11409775-1DE6-407E-A0F8-1A1BFA9C8724}" srcOrd="0" destOrd="0" presId="urn:microsoft.com/office/officeart/2005/8/layout/hList1"/>
-    <dgm:cxn modelId="{596B5811-F80E-4D3C-AFBA-AB12C75D6224}" type="presOf" srcId="{6ADED88B-CE03-44F6-A90E-346A361FA214}" destId="{D414A80B-C46D-48DF-84CA-8B5B99EAB705}" srcOrd="0" destOrd="0" presId="urn:microsoft.com/office/officeart/2005/8/layout/hList1"/>
-    <dgm:cxn modelId="{6965EA23-8370-4668-B0DE-4F5978F85BA1}" type="presOf" srcId="{FC7CA1D8-7D9F-4D0C-9C8D-A362DFD800FF}" destId="{84A34885-FE15-4377-A45C-B70B7422E73D}" srcOrd="0" destOrd="0" presId="urn:microsoft.com/office/officeart/2005/8/layout/hList1"/>
+    <dgm:cxn modelId="{3A7373BC-4F35-4D03-A551-F8303E9C060B}" type="presOf" srcId="{3F748F33-D80B-4B79-8DC9-29B2CA036E67}" destId="{7293FCF8-6EF7-4436-86DD-10BC869183EE}" srcOrd="0" destOrd="0" presId="urn:microsoft.com/office/officeart/2005/8/layout/hList1"/>
     <dgm:cxn modelId="{A9EE425D-A19C-4497-9370-5D5E48A8BE05}" type="presOf" srcId="{780FA0FF-B545-414D-875B-9AC5673FD996}" destId="{84A34885-FE15-4377-A45C-B70B7422E73D}" srcOrd="0" destOrd="1" presId="urn:microsoft.com/office/officeart/2005/8/layout/hList1"/>
-    <dgm:cxn modelId="{3746ABED-F3ED-464F-93E7-35A6409D4FDB}" srcId="{AAEBAAFD-257B-48A4-B1FE-2A7C14C5E515}" destId="{A77522B5-B997-435D-BF75-8B2280DEE119}" srcOrd="0" destOrd="0" parTransId="{DBDCA326-FF57-4A02-A364-9D256241F5E0}" sibTransId="{3AA9A4F7-9333-483C-B7E5-572154D4E92C}"/>
-    <dgm:cxn modelId="{2AE590DA-3177-40C3-A927-BA52BD2A58A5}" srcId="{6ADED88B-CE03-44F6-A90E-346A361FA214}" destId="{3F748F33-D80B-4B79-8DC9-29B2CA036E67}" srcOrd="2" destOrd="0" parTransId="{A8BF67A4-A496-47ED-A438-89F4CF3BD676}" sibTransId="{1FE95B35-05B6-4F1F-BAFB-35F0F36510D4}"/>
     <dgm:cxn modelId="{2C93C71C-F8A1-4EF3-998C-9BABB4A46C55}" srcId="{3F748F33-D80B-4B79-8DC9-29B2CA036E67}" destId="{780FA0FF-B545-414D-875B-9AC5673FD996}" srcOrd="1" destOrd="0" parTransId="{B4999D9F-B269-4195-ADD6-E6A202536EC4}" sibTransId="{2BDA8C00-04B9-4C11-87C3-53E7725BD705}"/>
-    <dgm:cxn modelId="{3A7373BC-4F35-4D03-A551-F8303E9C060B}" type="presOf" srcId="{3F748F33-D80B-4B79-8DC9-29B2CA036E67}" destId="{7293FCF8-6EF7-4436-86DD-10BC869183EE}" srcOrd="0" destOrd="0" presId="urn:microsoft.com/office/officeart/2005/8/layout/hList1"/>
-    <dgm:cxn modelId="{9AD68AB1-1CFB-4ED7-8DE7-A1C826C15FFD}" srcId="{6ADED88B-CE03-44F6-A90E-346A361FA214}" destId="{AAEBAAFD-257B-48A4-B1FE-2A7C14C5E515}" srcOrd="0" destOrd="0" parTransId="{F1F65346-0E9B-4F8F-AA7D-CEE7845BC411}" sibTransId="{41C05ACC-10AA-4089-A900-BE3438B85171}"/>
-    <dgm:cxn modelId="{E9FFACC5-1445-43B2-9D06-4BFA4C96A12C}" srcId="{AAEBAAFD-257B-48A4-B1FE-2A7C14C5E515}" destId="{94A9AB30-51EE-4CA4-A868-5D1E8977ED08}" srcOrd="1" destOrd="0" parTransId="{6F1B4BC1-A513-4F6B-B2FF-BE9F9000C409}" sibTransId="{1F369402-3CCA-491D-89BA-4173AC0D4812}"/>
     <dgm:cxn modelId="{1837DB7F-B2C3-4555-9022-8F0B11ECA1CD}" type="presParOf" srcId="{D414A80B-C46D-48DF-84CA-8B5B99EAB705}" destId="{43729492-7F55-4974-9856-02F7A8B77A46}" srcOrd="0" destOrd="0" presId="urn:microsoft.com/office/officeart/2005/8/layout/hList1"/>
     <dgm:cxn modelId="{100E442F-B514-414D-A8E4-A1E61C6945A9}" type="presParOf" srcId="{43729492-7F55-4974-9856-02F7A8B77A46}" destId="{11409775-1DE6-407E-A0F8-1A1BFA9C8724}" srcOrd="0" destOrd="0" presId="urn:microsoft.com/office/officeart/2005/8/layout/hList1"/>
     <dgm:cxn modelId="{D0950A2E-8DB4-4158-80B4-8ADC118B37C7}" type="presParOf" srcId="{43729492-7F55-4974-9856-02F7A8B77A46}" destId="{45418856-5B8C-4BC1-A946-1C75CB13470B}" srcOrd="1" destOrd="0" presId="urn:microsoft.com/office/officeart/2005/8/layout/hList1"/>
@@ -2272,7 +2284,7 @@
   <dgm:whole/>
   <dgm:extLst>
     <a:ext uri="http://schemas.microsoft.com/office/drawing/2008/diagram">
-      <dsp:dataModelExt xmlns:dsp="http://schemas.microsoft.com/office/drawing/2008/diagram" relId="rId7" minVer="http://schemas.openxmlformats.org/drawingml/2006/diagram"/>
+      <dsp:dataModelExt xmlns:dsp="http://schemas.microsoft.com/office/drawing/2008/diagram" xmlns="" relId="rId7" minVer="http://schemas.openxmlformats.org/drawingml/2006/diagram"/>
     </a:ext>
   </dgm:extLst>
 </dgm:dataModel>
@@ -3029,36 +3041,36 @@
     </dgm:pt>
   </dgm:ptLst>
   <dgm:cxnLst>
+    <dgm:cxn modelId="{D7B67251-0A91-460E-9A11-D1216EAFE487}" srcId="{F5F4E3EA-E94D-4DA9-AAE9-1132AFA87A6A}" destId="{F2005BE5-81B6-40A9-9D1F-71CD1FD815E2}" srcOrd="1" destOrd="0" parTransId="{E6BB0DDF-CC0A-4916-9407-68CB3899C854}" sibTransId="{B5659DF2-7200-4EA0-A527-DC3248B8F1D3}"/>
+    <dgm:cxn modelId="{5FE8F49F-E116-46A3-92A0-97EEE0A84F7A}" srcId="{F5F4E3EA-E94D-4DA9-AAE9-1132AFA87A6A}" destId="{273E4573-2602-4D95-86CF-602B0B9B75CA}" srcOrd="7" destOrd="0" parTransId="{1DF2439C-F2A0-47DF-9FFF-75F3D88A6337}" sibTransId="{E393E1D0-1F78-4813-ADB5-0D0FC5AEF02B}"/>
+    <dgm:cxn modelId="{B7C29736-64C1-4A3C-910F-42DDC2F02215}" srcId="{F5F4E3EA-E94D-4DA9-AAE9-1132AFA87A6A}" destId="{2440E998-89FA-4EFA-A72D-C66433390683}" srcOrd="0" destOrd="0" parTransId="{FBEB87BC-07B5-4D1E-B68F-CFA13032B0C7}" sibTransId="{CC1205B9-2E23-486A-BEC0-3F5F12DBA8C6}"/>
     <dgm:cxn modelId="{49D0FBFE-FBBE-4647-A13A-1D1B6912D866}" type="presOf" srcId="{F2005BE5-81B6-40A9-9D1F-71CD1FD815E2}" destId="{C8E03111-2D96-43BF-AEE9-0B6C973096A1}" srcOrd="0" destOrd="0" presId="urn:microsoft.com/office/officeart/2005/8/layout/bProcess4"/>
+    <dgm:cxn modelId="{FC4948E6-B5EE-4100-A129-ACE4CC47F51D}" srcId="{F5F4E3EA-E94D-4DA9-AAE9-1132AFA87A6A}" destId="{121D37B1-6FF9-4571-862C-816AA053E327}" srcOrd="3" destOrd="0" parTransId="{66E4B04C-ABF9-4EF4-99A0-77CA9B9984AD}" sibTransId="{3EF3531F-83EF-4ECD-A76A-8180D613D4F3}"/>
+    <dgm:cxn modelId="{6331F8AD-8063-4264-9125-F11D08960CB0}" type="presOf" srcId="{40078582-36BE-4A5F-BCFE-9473F52E08F1}" destId="{7AA70188-DE8E-46BE-9CE7-B4EF34F4C4B3}" srcOrd="0" destOrd="0" presId="urn:microsoft.com/office/officeart/2005/8/layout/bProcess4"/>
+    <dgm:cxn modelId="{2ABE4A33-30E7-443E-883F-FAFD88500835}" type="presOf" srcId="{3321D001-DB76-481E-9340-110E2D5B5ACE}" destId="{ED2A6F8B-8811-492D-BF45-587A6DE0E6A8}" srcOrd="0" destOrd="0" presId="urn:microsoft.com/office/officeart/2005/8/layout/bProcess4"/>
+    <dgm:cxn modelId="{C25D1441-6B57-4117-B744-366A69079EE1}" type="presOf" srcId="{273E4573-2602-4D95-86CF-602B0B9B75CA}" destId="{3215AD01-AC03-4545-B2CA-61C01DB9E894}" srcOrd="0" destOrd="0" presId="urn:microsoft.com/office/officeart/2005/8/layout/bProcess4"/>
+    <dgm:cxn modelId="{72E4B868-B9B6-4C5E-A13B-8132BD45B98E}" srcId="{F5F4E3EA-E94D-4DA9-AAE9-1132AFA87A6A}" destId="{1F7D449F-9520-4407-B707-5DF9C7B737C5}" srcOrd="4" destOrd="0" parTransId="{39690148-5A71-4843-866D-5C460478A99E}" sibTransId="{2AE27A5C-5EBE-4AF8-804F-EA9B06692086}"/>
+    <dgm:cxn modelId="{0C47CC94-E2CF-494E-9BD6-37F7B2757CAD}" type="presOf" srcId="{F5F4E3EA-E94D-4DA9-AAE9-1132AFA87A6A}" destId="{0EA0EAA0-221F-4EC3-8DE4-BAB1C4B3F6A2}" srcOrd="0" destOrd="0" presId="urn:microsoft.com/office/officeart/2005/8/layout/bProcess4"/>
     <dgm:cxn modelId="{32BC61D8-7025-46BD-A385-AB8561059CF3}" type="presOf" srcId="{E393E1D0-1F78-4813-ADB5-0D0FC5AEF02B}" destId="{716196C0-86D2-4CBA-B8E5-AD9B20135694}" srcOrd="0" destOrd="0" presId="urn:microsoft.com/office/officeart/2005/8/layout/bProcess4"/>
+    <dgm:cxn modelId="{D122E0F7-0237-45A2-90F1-E647EEC850D4}" type="presOf" srcId="{8413A8B3-D7D4-471D-85E1-39377B25FA03}" destId="{0BBFA2C5-285D-4867-9326-B064D4EDE745}" srcOrd="0" destOrd="0" presId="urn:microsoft.com/office/officeart/2005/8/layout/bProcess4"/>
+    <dgm:cxn modelId="{0B8D3AEF-04FE-4549-A094-83DF0DA66161}" srcId="{F5F4E3EA-E94D-4DA9-AAE9-1132AFA87A6A}" destId="{FF87FAED-B62C-4F5A-867D-3862EA3063FA}" srcOrd="6" destOrd="0" parTransId="{67A20901-6564-42AD-AF03-844CCCA74BD0}" sibTransId="{43D2D773-12DB-4AB3-8017-FA0DD336AA9A}"/>
+    <dgm:cxn modelId="{77B8FBBA-DA28-4872-9B62-5CED4A0376F9}" type="presOf" srcId="{B5659DF2-7200-4EA0-A527-DC3248B8F1D3}" destId="{4B81B544-0D27-4524-B981-04D4FC37E6CB}" srcOrd="0" destOrd="0" presId="urn:microsoft.com/office/officeart/2005/8/layout/bProcess4"/>
+    <dgm:cxn modelId="{FADC42CD-5675-42F8-AE3E-535C9F175850}" srcId="{F5F4E3EA-E94D-4DA9-AAE9-1132AFA87A6A}" destId="{97B515AE-2926-4F4B-B178-67FE14F5C50E}" srcOrd="9" destOrd="0" parTransId="{EFA159B2-5492-45C0-B2A0-BC59F60E12C1}" sibTransId="{2ACD7EEF-8BE7-4580-B983-E8FDAEDFAE2A}"/>
+    <dgm:cxn modelId="{50C15F47-1E96-4769-8B86-7576FA54946D}" type="presOf" srcId="{43D2D773-12DB-4AB3-8017-FA0DD336AA9A}" destId="{A2031645-D319-4462-B675-8D99AC5AB668}" srcOrd="0" destOrd="0" presId="urn:microsoft.com/office/officeart/2005/8/layout/bProcess4"/>
+    <dgm:cxn modelId="{F7CBADF5-C709-4B1B-8F4C-A83843BD416C}" type="presOf" srcId="{2440E998-89FA-4EFA-A72D-C66433390683}" destId="{D23AD35F-2B05-4B02-9BB3-60F91BFED688}" srcOrd="0" destOrd="0" presId="urn:microsoft.com/office/officeart/2005/8/layout/bProcess4"/>
+    <dgm:cxn modelId="{8554BACB-E08D-4FC0-8090-351EC7585488}" type="presOf" srcId="{77495496-FA91-424B-AC28-0A1CE6563580}" destId="{F7383F3F-317D-43C5-88CA-BED49B8C784D}" srcOrd="0" destOrd="0" presId="urn:microsoft.com/office/officeart/2005/8/layout/bProcess4"/>
+    <dgm:cxn modelId="{84AF6E99-D006-4224-AF5F-E1B7C694D8D4}" type="presOf" srcId="{1F7D449F-9520-4407-B707-5DF9C7B737C5}" destId="{1401E86D-AECD-480A-902E-497FC3F35BCE}" srcOrd="0" destOrd="0" presId="urn:microsoft.com/office/officeart/2005/8/layout/bProcess4"/>
     <dgm:cxn modelId="{AD934956-8E7B-40DB-8155-DA1150BEED51}" type="presOf" srcId="{C2C77EF6-8BC8-4249-99F9-981DBF82F06E}" destId="{CE0FC786-B36E-4E34-9509-1962ADD8D614}" srcOrd="0" destOrd="0" presId="urn:microsoft.com/office/officeart/2005/8/layout/bProcess4"/>
-    <dgm:cxn modelId="{0B8D3AEF-04FE-4549-A094-83DF0DA66161}" srcId="{F5F4E3EA-E94D-4DA9-AAE9-1132AFA87A6A}" destId="{FF87FAED-B62C-4F5A-867D-3862EA3063FA}" srcOrd="6" destOrd="0" parTransId="{67A20901-6564-42AD-AF03-844CCCA74BD0}" sibTransId="{43D2D773-12DB-4AB3-8017-FA0DD336AA9A}"/>
-    <dgm:cxn modelId="{78A8DBE0-4731-4D76-956B-2F6FBE34E028}" type="presOf" srcId="{DD6957EB-D383-46C9-B85D-C0A70BFC4E6E}" destId="{BA9AA43F-6670-452C-BDF7-8463A86E2639}" srcOrd="0" destOrd="0" presId="urn:microsoft.com/office/officeart/2005/8/layout/bProcess4"/>
-    <dgm:cxn modelId="{5FE8F49F-E116-46A3-92A0-97EEE0A84F7A}" srcId="{F5F4E3EA-E94D-4DA9-AAE9-1132AFA87A6A}" destId="{273E4573-2602-4D95-86CF-602B0B9B75CA}" srcOrd="7" destOrd="0" parTransId="{1DF2439C-F2A0-47DF-9FFF-75F3D88A6337}" sibTransId="{E393E1D0-1F78-4813-ADB5-0D0FC5AEF02B}"/>
-    <dgm:cxn modelId="{2ABE4A33-30E7-443E-883F-FAFD88500835}" type="presOf" srcId="{3321D001-DB76-481E-9340-110E2D5B5ACE}" destId="{ED2A6F8B-8811-492D-BF45-587A6DE0E6A8}" srcOrd="0" destOrd="0" presId="urn:microsoft.com/office/officeart/2005/8/layout/bProcess4"/>
-    <dgm:cxn modelId="{47B8A9EA-DE90-4FF2-BCC6-C3F74F734FFC}" type="presOf" srcId="{97B515AE-2926-4F4B-B178-67FE14F5C50E}" destId="{31C7262F-1B23-4D00-AC07-DBFC50BBF115}" srcOrd="0" destOrd="0" presId="urn:microsoft.com/office/officeart/2005/8/layout/bProcess4"/>
-    <dgm:cxn modelId="{64AFB570-050C-4224-8548-E5C18AAF7D35}" type="presOf" srcId="{3EF3531F-83EF-4ECD-A76A-8180D613D4F3}" destId="{28DB4DAD-5303-471B-B399-A8B181A257F2}" srcOrd="0" destOrd="0" presId="urn:microsoft.com/office/officeart/2005/8/layout/bProcess4"/>
-    <dgm:cxn modelId="{B7C29736-64C1-4A3C-910F-42DDC2F02215}" srcId="{F5F4E3EA-E94D-4DA9-AAE9-1132AFA87A6A}" destId="{2440E998-89FA-4EFA-A72D-C66433390683}" srcOrd="0" destOrd="0" parTransId="{FBEB87BC-07B5-4D1E-B68F-CFA13032B0C7}" sibTransId="{CC1205B9-2E23-486A-BEC0-3F5F12DBA8C6}"/>
-    <dgm:cxn modelId="{5E2923D8-FDB8-4983-A0AE-817E6D8DEA10}" type="presOf" srcId="{FF87FAED-B62C-4F5A-867D-3862EA3063FA}" destId="{9B27FF8A-F8E9-4B2A-9BA9-FDA789B76541}" srcOrd="0" destOrd="0" presId="urn:microsoft.com/office/officeart/2005/8/layout/bProcess4"/>
-    <dgm:cxn modelId="{D7B67251-0A91-460E-9A11-D1216EAFE487}" srcId="{F5F4E3EA-E94D-4DA9-AAE9-1132AFA87A6A}" destId="{F2005BE5-81B6-40A9-9D1F-71CD1FD815E2}" srcOrd="1" destOrd="0" parTransId="{E6BB0DDF-CC0A-4916-9407-68CB3899C854}" sibTransId="{B5659DF2-7200-4EA0-A527-DC3248B8F1D3}"/>
-    <dgm:cxn modelId="{8554BACB-E08D-4FC0-8090-351EC7585488}" type="presOf" srcId="{77495496-FA91-424B-AC28-0A1CE6563580}" destId="{F7383F3F-317D-43C5-88CA-BED49B8C784D}" srcOrd="0" destOrd="0" presId="urn:microsoft.com/office/officeart/2005/8/layout/bProcess4"/>
-    <dgm:cxn modelId="{F7CBADF5-C709-4B1B-8F4C-A83843BD416C}" type="presOf" srcId="{2440E998-89FA-4EFA-A72D-C66433390683}" destId="{D23AD35F-2B05-4B02-9BB3-60F91BFED688}" srcOrd="0" destOrd="0" presId="urn:microsoft.com/office/officeart/2005/8/layout/bProcess4"/>
-    <dgm:cxn modelId="{C25D1441-6B57-4117-B744-366A69079EE1}" type="presOf" srcId="{273E4573-2602-4D95-86CF-602B0B9B75CA}" destId="{3215AD01-AC03-4545-B2CA-61C01DB9E894}" srcOrd="0" destOrd="0" presId="urn:microsoft.com/office/officeart/2005/8/layout/bProcess4"/>
-    <dgm:cxn modelId="{6331F8AD-8063-4264-9125-F11D08960CB0}" type="presOf" srcId="{40078582-36BE-4A5F-BCFE-9473F52E08F1}" destId="{7AA70188-DE8E-46BE-9CE7-B4EF34F4C4B3}" srcOrd="0" destOrd="0" presId="urn:microsoft.com/office/officeart/2005/8/layout/bProcess4"/>
-    <dgm:cxn modelId="{FC4948E6-B5EE-4100-A129-ACE4CC47F51D}" srcId="{F5F4E3EA-E94D-4DA9-AAE9-1132AFA87A6A}" destId="{121D37B1-6FF9-4571-862C-816AA053E327}" srcOrd="3" destOrd="0" parTransId="{66E4B04C-ABF9-4EF4-99A0-77CA9B9984AD}" sibTransId="{3EF3531F-83EF-4ECD-A76A-8180D613D4F3}"/>
-    <dgm:cxn modelId="{FADC42CD-5675-42F8-AE3E-535C9F175850}" srcId="{F5F4E3EA-E94D-4DA9-AAE9-1132AFA87A6A}" destId="{97B515AE-2926-4F4B-B178-67FE14F5C50E}" srcOrd="9" destOrd="0" parTransId="{EFA159B2-5492-45C0-B2A0-BC59F60E12C1}" sibTransId="{2ACD7EEF-8BE7-4580-B983-E8FDAEDFAE2A}"/>
-    <dgm:cxn modelId="{28408128-A94C-4A43-A03C-FC67C512BEA9}" type="presOf" srcId="{121D37B1-6FF9-4571-862C-816AA053E327}" destId="{B9F8F33B-827B-4E86-9C18-8072E97D0184}" srcOrd="0" destOrd="0" presId="urn:microsoft.com/office/officeart/2005/8/layout/bProcess4"/>
-    <dgm:cxn modelId="{77B8FBBA-DA28-4872-9B62-5CED4A0376F9}" type="presOf" srcId="{B5659DF2-7200-4EA0-A527-DC3248B8F1D3}" destId="{4B81B544-0D27-4524-B981-04D4FC37E6CB}" srcOrd="0" destOrd="0" presId="urn:microsoft.com/office/officeart/2005/8/layout/bProcess4"/>
-    <dgm:cxn modelId="{3367EEE9-B5A9-4C58-8AC3-A9A550C60AE2}" srcId="{F5F4E3EA-E94D-4DA9-AAE9-1132AFA87A6A}" destId="{DD6957EB-D383-46C9-B85D-C0A70BFC4E6E}" srcOrd="8" destOrd="0" parTransId="{C5B5305F-1B00-458D-93F8-4D068659F99C}" sibTransId="{3321D001-DB76-481E-9340-110E2D5B5ACE}"/>
-    <dgm:cxn modelId="{50C15F47-1E96-4769-8B86-7576FA54946D}" type="presOf" srcId="{43D2D773-12DB-4AB3-8017-FA0DD336AA9A}" destId="{A2031645-D319-4462-B675-8D99AC5AB668}" srcOrd="0" destOrd="0" presId="urn:microsoft.com/office/officeart/2005/8/layout/bProcess4"/>
-    <dgm:cxn modelId="{D122E0F7-0237-45A2-90F1-E647EEC850D4}" type="presOf" srcId="{8413A8B3-D7D4-471D-85E1-39377B25FA03}" destId="{0BBFA2C5-285D-4867-9326-B064D4EDE745}" srcOrd="0" destOrd="0" presId="urn:microsoft.com/office/officeart/2005/8/layout/bProcess4"/>
-    <dgm:cxn modelId="{FEB4DE48-CCFB-4674-8522-F9CBA542BF4B}" srcId="{F5F4E3EA-E94D-4DA9-AAE9-1132AFA87A6A}" destId="{C2C77EF6-8BC8-4249-99F9-981DBF82F06E}" srcOrd="5" destOrd="0" parTransId="{F69F97FE-4DAD-4D2D-94B9-3DE298E11F30}" sibTransId="{40078582-36BE-4A5F-BCFE-9473F52E08F1}"/>
+    <dgm:cxn modelId="{3D590043-4FC7-4D8C-BB5D-8A596D501750}" type="presOf" srcId="{CC1205B9-2E23-486A-BEC0-3F5F12DBA8C6}" destId="{3CF68212-F1C4-4C60-AFDB-F6E0E56308CC}" srcOrd="0" destOrd="0" presId="urn:microsoft.com/office/officeart/2005/8/layout/bProcess4"/>
     <dgm:cxn modelId="{E228EEDD-8223-4AB1-82D2-8B32063A9AF4}" srcId="{F5F4E3EA-E94D-4DA9-AAE9-1132AFA87A6A}" destId="{77495496-FA91-424B-AC28-0A1CE6563580}" srcOrd="2" destOrd="0" parTransId="{15124FF5-04C0-421A-9EC7-501CFC624455}" sibTransId="{8413A8B3-D7D4-471D-85E1-39377B25FA03}"/>
     <dgm:cxn modelId="{3E5D2C60-1625-4AFE-9B76-F65DB69C5C3D}" type="presOf" srcId="{2AE27A5C-5EBE-4AF8-804F-EA9B06692086}" destId="{D0A0174A-8916-4947-B177-E3E26111BC26}" srcOrd="0" destOrd="0" presId="urn:microsoft.com/office/officeart/2005/8/layout/bProcess4"/>
-    <dgm:cxn modelId="{72E4B868-B9B6-4C5E-A13B-8132BD45B98E}" srcId="{F5F4E3EA-E94D-4DA9-AAE9-1132AFA87A6A}" destId="{1F7D449F-9520-4407-B707-5DF9C7B737C5}" srcOrd="4" destOrd="0" parTransId="{39690148-5A71-4843-866D-5C460478A99E}" sibTransId="{2AE27A5C-5EBE-4AF8-804F-EA9B06692086}"/>
-    <dgm:cxn modelId="{0C47CC94-E2CF-494E-9BD6-37F7B2757CAD}" type="presOf" srcId="{F5F4E3EA-E94D-4DA9-AAE9-1132AFA87A6A}" destId="{0EA0EAA0-221F-4EC3-8DE4-BAB1C4B3F6A2}" srcOrd="0" destOrd="0" presId="urn:microsoft.com/office/officeart/2005/8/layout/bProcess4"/>
-    <dgm:cxn modelId="{84AF6E99-D006-4224-AF5F-E1B7C694D8D4}" type="presOf" srcId="{1F7D449F-9520-4407-B707-5DF9C7B737C5}" destId="{1401E86D-AECD-480A-902E-497FC3F35BCE}" srcOrd="0" destOrd="0" presId="urn:microsoft.com/office/officeart/2005/8/layout/bProcess4"/>
-    <dgm:cxn modelId="{3D590043-4FC7-4D8C-BB5D-8A596D501750}" type="presOf" srcId="{CC1205B9-2E23-486A-BEC0-3F5F12DBA8C6}" destId="{3CF68212-F1C4-4C60-AFDB-F6E0E56308CC}" srcOrd="0" destOrd="0" presId="urn:microsoft.com/office/officeart/2005/8/layout/bProcess4"/>
+    <dgm:cxn modelId="{3367EEE9-B5A9-4C58-8AC3-A9A550C60AE2}" srcId="{F5F4E3EA-E94D-4DA9-AAE9-1132AFA87A6A}" destId="{DD6957EB-D383-46C9-B85D-C0A70BFC4E6E}" srcOrd="8" destOrd="0" parTransId="{C5B5305F-1B00-458D-93F8-4D068659F99C}" sibTransId="{3321D001-DB76-481E-9340-110E2D5B5ACE}"/>
+    <dgm:cxn modelId="{FEB4DE48-CCFB-4674-8522-F9CBA542BF4B}" srcId="{F5F4E3EA-E94D-4DA9-AAE9-1132AFA87A6A}" destId="{C2C77EF6-8BC8-4249-99F9-981DBF82F06E}" srcOrd="5" destOrd="0" parTransId="{F69F97FE-4DAD-4D2D-94B9-3DE298E11F30}" sibTransId="{40078582-36BE-4A5F-BCFE-9473F52E08F1}"/>
+    <dgm:cxn modelId="{47B8A9EA-DE90-4FF2-BCC6-C3F74F734FFC}" type="presOf" srcId="{97B515AE-2926-4F4B-B178-67FE14F5C50E}" destId="{31C7262F-1B23-4D00-AC07-DBFC50BBF115}" srcOrd="0" destOrd="0" presId="urn:microsoft.com/office/officeart/2005/8/layout/bProcess4"/>
+    <dgm:cxn modelId="{5E2923D8-FDB8-4983-A0AE-817E6D8DEA10}" type="presOf" srcId="{FF87FAED-B62C-4F5A-867D-3862EA3063FA}" destId="{9B27FF8A-F8E9-4B2A-9BA9-FDA789B76541}" srcOrd="0" destOrd="0" presId="urn:microsoft.com/office/officeart/2005/8/layout/bProcess4"/>
+    <dgm:cxn modelId="{28408128-A94C-4A43-A03C-FC67C512BEA9}" type="presOf" srcId="{121D37B1-6FF9-4571-862C-816AA053E327}" destId="{B9F8F33B-827B-4E86-9C18-8072E97D0184}" srcOrd="0" destOrd="0" presId="urn:microsoft.com/office/officeart/2005/8/layout/bProcess4"/>
+    <dgm:cxn modelId="{64AFB570-050C-4224-8548-E5C18AAF7D35}" type="presOf" srcId="{3EF3531F-83EF-4ECD-A76A-8180D613D4F3}" destId="{28DB4DAD-5303-471B-B399-A8B181A257F2}" srcOrd="0" destOrd="0" presId="urn:microsoft.com/office/officeart/2005/8/layout/bProcess4"/>
+    <dgm:cxn modelId="{78A8DBE0-4731-4D76-956B-2F6FBE34E028}" type="presOf" srcId="{DD6957EB-D383-46C9-B85D-C0A70BFC4E6E}" destId="{BA9AA43F-6670-452C-BDF7-8463A86E2639}" srcOrd="0" destOrd="0" presId="urn:microsoft.com/office/officeart/2005/8/layout/bProcess4"/>
     <dgm:cxn modelId="{D67B2B2B-6BB4-4507-81FD-1150470E2622}" type="presParOf" srcId="{0EA0EAA0-221F-4EC3-8DE4-BAB1C4B3F6A2}" destId="{A17DE1C6-6E49-408A-9736-7EF4FBC31435}" srcOrd="0" destOrd="0" presId="urn:microsoft.com/office/officeart/2005/8/layout/bProcess4"/>
     <dgm:cxn modelId="{7E36F69B-246E-4FCA-914A-BE465844ADB9}" type="presParOf" srcId="{A17DE1C6-6E49-408A-9736-7EF4FBC31435}" destId="{BA911427-1561-418F-85C1-41C32BDA9EDC}" srcOrd="0" destOrd="0" presId="urn:microsoft.com/office/officeart/2005/8/layout/bProcess4"/>
     <dgm:cxn modelId="{605CE9B2-876C-4E22-B10F-647CB24D390B}" type="presParOf" srcId="{A17DE1C6-6E49-408A-9736-7EF4FBC31435}" destId="{D23AD35F-2B05-4B02-9BB3-60F91BFED688}" srcOrd="1" destOrd="0" presId="urn:microsoft.com/office/officeart/2005/8/layout/bProcess4"/>
@@ -3103,14 +3115,14 @@
   <dgm:whole/>
   <dgm:extLst>
     <a:ext uri="http://schemas.microsoft.com/office/drawing/2008/diagram">
-      <dsp:dataModelExt xmlns:dsp="http://schemas.microsoft.com/office/drawing/2008/diagram" relId="rId6" minVer="http://schemas.openxmlformats.org/drawingml/2006/diagram"/>
+      <dsp:dataModelExt xmlns:dsp="http://schemas.microsoft.com/office/drawing/2008/diagram" xmlns="" relId="rId6" minVer="http://schemas.openxmlformats.org/drawingml/2006/diagram"/>
     </a:ext>
   </dgm:extLst>
 </dgm:dataModel>
 </file>
 
 <file path=ppt/diagrams/drawing1.xml><?xml version="1.0" encoding="utf-8"?>
-<dsp:drawing xmlns:dgm="http://schemas.openxmlformats.org/drawingml/2006/diagram" xmlns:dsp="http://schemas.microsoft.com/office/drawing/2008/diagram" xmlns:a="http://schemas.openxmlformats.org/drawingml/2006/main">
+<dsp:drawing xmlns:dgm="http://schemas.openxmlformats.org/drawingml/2006/diagram" xmlns:a="http://schemas.openxmlformats.org/drawingml/2006/main" xmlns:dsp="http://schemas.microsoft.com/office/drawing/2008/diagram">
   <dsp:spTree>
     <dsp:nvGrpSpPr>
       <dsp:cNvPr id="0" name=""/>
@@ -3264,7 +3276,11 @@
           </a:pPr>
           <a:r>
             <a:rPr lang="en-US" sz="2400" kern="1200" dirty="0" smtClean="0"/>
-            <a:t>reduce gender wage gap among the OECD</a:t>
+            <a:t>Reduce </a:t>
+          </a:r>
+          <a:r>
+            <a:rPr lang="en-US" sz="2400" kern="1200" dirty="0" smtClean="0"/>
+            <a:t>gender wage gap among the OECD</a:t>
           </a:r>
           <a:endParaRPr lang="he-IL" sz="2400" kern="1200" dirty="0"/>
         </a:p>
@@ -3283,7 +3299,11 @@
           </a:pPr>
           <a:r>
             <a:rPr lang="en-US" sz="2400" kern="1200" dirty="0" smtClean="0"/>
-            <a:t>discover non trivial dependencies</a:t>
+            <a:t>Discover </a:t>
+          </a:r>
+          <a:r>
+            <a:rPr lang="en-US" sz="2400" kern="1200" dirty="0" smtClean="0"/>
+            <a:t>non trivial dependencies</a:t>
           </a:r>
           <a:endParaRPr lang="he-IL" sz="2400" kern="1200" dirty="0"/>
         </a:p>
@@ -3347,7 +3367,7 @@
           <a:endParaRPr lang="he-IL" sz="4500" kern="1200" dirty="0"/>
         </a:p>
       </dsp:txBody>
-      <dsp:txXfrm rot="10800000">
+      <dsp:txXfrm flipV="1">
         <a:off x="4017007" y="1760497"/>
         <a:ext cx="3512415" cy="51543"/>
       </dsp:txXfrm>
@@ -3551,7 +3571,11 @@
           </a:pPr>
           <a:r>
             <a:rPr lang="en-US" sz="2400" kern="1200" dirty="0" smtClean="0"/>
-            <a:t>averaging state predictions</a:t>
+            <a:t>Averaging </a:t>
+          </a:r>
+          <a:r>
+            <a:rPr lang="en-US" sz="2400" kern="1200" dirty="0" smtClean="0"/>
+            <a:t>state predictions</a:t>
           </a:r>
           <a:endParaRPr lang="he-IL" sz="2400" kern="1200" dirty="0"/>
         </a:p>
@@ -3566,7 +3590,7 @@
 </file>
 
 <file path=ppt/diagrams/drawing2.xml><?xml version="1.0" encoding="utf-8"?>
-<dsp:drawing xmlns:dgm="http://schemas.openxmlformats.org/drawingml/2006/diagram" xmlns:dsp="http://schemas.microsoft.com/office/drawing/2008/diagram" xmlns:a="http://schemas.openxmlformats.org/drawingml/2006/main">
+<dsp:drawing xmlns:dgm="http://schemas.openxmlformats.org/drawingml/2006/diagram" xmlns:a="http://schemas.openxmlformats.org/drawingml/2006/main" xmlns:dsp="http://schemas.microsoft.com/office/drawing/2008/diagram">
   <dsp:spTree>
     <dsp:nvGrpSpPr>
       <dsp:cNvPr id="0" name=""/>
@@ -3689,8 +3713,8 @@
         </a:p>
       </dsp:txBody>
       <dsp:txXfrm>
-        <a:off x="1229659" y="37231"/>
-        <a:ext cx="2016002" cy="1180226"/>
+        <a:off x="1192940" y="512"/>
+        <a:ext cx="2089440" cy="1253664"/>
       </dsp:txXfrm>
     </dsp:sp>
     <dsp:sp modelId="{4B81B544-0D27-4524-B981-04D4FC37E6CB}">
@@ -3809,8 +3833,8 @@
         </a:p>
       </dsp:txBody>
       <dsp:txXfrm>
-        <a:off x="1229659" y="1604312"/>
-        <a:ext cx="2016002" cy="1180226"/>
+        <a:off x="1192940" y="1567593"/>
+        <a:ext cx="2089440" cy="1253664"/>
       </dsp:txXfrm>
     </dsp:sp>
     <dsp:sp modelId="{0BBFA2C5-285D-4867-9326-B064D4EDE745}">
@@ -3929,8 +3953,8 @@
         </a:p>
       </dsp:txBody>
       <dsp:txXfrm>
-        <a:off x="1229659" y="3171392"/>
-        <a:ext cx="2016002" cy="1180226"/>
+        <a:off x="1192940" y="3134673"/>
+        <a:ext cx="2089440" cy="1253664"/>
       </dsp:txXfrm>
     </dsp:sp>
     <dsp:sp modelId="{28DB4DAD-5303-471B-B399-A8B181A257F2}">
@@ -4049,8 +4073,8 @@
         </a:p>
       </dsp:txBody>
       <dsp:txXfrm>
-        <a:off x="1229659" y="4738472"/>
-        <a:ext cx="2016002" cy="1180226"/>
+        <a:off x="1192940" y="4701753"/>
+        <a:ext cx="2089440" cy="1253664"/>
       </dsp:txXfrm>
     </dsp:sp>
     <dsp:sp modelId="{D0A0174A-8916-4947-B177-E3E26111BC26}">
@@ -4169,8 +4193,8 @@
         </a:p>
       </dsp:txBody>
       <dsp:txXfrm>
-        <a:off x="4008615" y="4738472"/>
-        <a:ext cx="2016002" cy="1180226"/>
+        <a:off x="3971896" y="4701753"/>
+        <a:ext cx="2089440" cy="1253664"/>
       </dsp:txXfrm>
     </dsp:sp>
     <dsp:sp modelId="{7AA70188-DE8E-46BE-9CE7-B4EF34F4C4B3}">
@@ -4289,8 +4313,8 @@
         </a:p>
       </dsp:txBody>
       <dsp:txXfrm>
-        <a:off x="4008615" y="3171392"/>
-        <a:ext cx="2016002" cy="1180226"/>
+        <a:off x="3971896" y="3134673"/>
+        <a:ext cx="2089440" cy="1253664"/>
       </dsp:txXfrm>
     </dsp:sp>
     <dsp:sp modelId="{A2031645-D319-4462-B675-8D99AC5AB668}">
@@ -4409,8 +4433,8 @@
         </a:p>
       </dsp:txBody>
       <dsp:txXfrm>
-        <a:off x="4008615" y="1604312"/>
-        <a:ext cx="2016002" cy="1180226"/>
+        <a:off x="3971896" y="1567593"/>
+        <a:ext cx="2089440" cy="1253664"/>
       </dsp:txXfrm>
     </dsp:sp>
     <dsp:sp modelId="{716196C0-86D2-4CBA-B8E5-AD9B20135694}">
@@ -4529,8 +4553,8 @@
         </a:p>
       </dsp:txBody>
       <dsp:txXfrm>
-        <a:off x="4008615" y="37231"/>
-        <a:ext cx="2016002" cy="1180226"/>
+        <a:off x="3971896" y="512"/>
+        <a:ext cx="2089440" cy="1253664"/>
       </dsp:txXfrm>
     </dsp:sp>
     <dsp:sp modelId="{ED2A6F8B-8811-492D-BF45-587A6DE0E6A8}">
@@ -4649,8 +4673,8 @@
         </a:p>
       </dsp:txBody>
       <dsp:txXfrm>
-        <a:off x="6787571" y="37231"/>
-        <a:ext cx="2016002" cy="1180226"/>
+        <a:off x="6750852" y="512"/>
+        <a:ext cx="2089440" cy="1253664"/>
       </dsp:txXfrm>
     </dsp:sp>
     <dsp:sp modelId="{31C7262F-1B23-4D00-AC07-DBFC50BBF115}">
@@ -4728,8 +4752,8 @@
         </a:p>
       </dsp:txBody>
       <dsp:txXfrm>
-        <a:off x="6787571" y="1604312"/>
-        <a:ext cx="2016002" cy="1180226"/>
+        <a:off x="6750852" y="1567593"/>
+        <a:ext cx="2089440" cy="1253664"/>
       </dsp:txXfrm>
     </dsp:sp>
   </dsp:spTree>
@@ -7716,7 +7740,7 @@
             <a:fld id="{DCCFA427-BB50-4F8D-8FC4-B0EA0BA5795C}" type="datetimeFigureOut">
               <a:rPr lang="en-US" smtClean="0"/>
               <a:pPr/>
-              <a:t>1/22/2017</a:t>
+              <a:t>1/26/2017</a:t>
             </a:fld>
             <a:endParaRPr lang="en-US"/>
           </a:p>
@@ -7800,7 +7824,7 @@
     </p:spTree>
     <p:extLst>
       <p:ext uri="{BB962C8B-B14F-4D97-AF65-F5344CB8AC3E}">
-        <p14:creationId xmlns:p14="http://schemas.microsoft.com/office/powerpoint/2010/main" val="254611623"/>
+        <p14:creationId xmlns:p14="http://schemas.microsoft.com/office/powerpoint/2010/main" xmlns="" val="254611623"/>
       </p:ext>
     </p:extLst>
   </p:cSld>
@@ -7920,7 +7944,7 @@
             <a:fld id="{DCCFA427-BB50-4F8D-8FC4-B0EA0BA5795C}" type="datetimeFigureOut">
               <a:rPr lang="en-US" smtClean="0"/>
               <a:pPr/>
-              <a:t>1/22/2017</a:t>
+              <a:t>1/26/2017</a:t>
             </a:fld>
             <a:endParaRPr lang="en-US"/>
           </a:p>
@@ -7972,7 +7996,7 @@
     </p:spTree>
     <p:extLst>
       <p:ext uri="{BB962C8B-B14F-4D97-AF65-F5344CB8AC3E}">
-        <p14:creationId xmlns:p14="http://schemas.microsoft.com/office/powerpoint/2010/main" val="2716736531"/>
+        <p14:creationId xmlns:p14="http://schemas.microsoft.com/office/powerpoint/2010/main" xmlns="" val="2716736531"/>
       </p:ext>
     </p:extLst>
   </p:cSld>
@@ -8102,7 +8126,7 @@
             <a:fld id="{DCCFA427-BB50-4F8D-8FC4-B0EA0BA5795C}" type="datetimeFigureOut">
               <a:rPr lang="en-US" smtClean="0"/>
               <a:pPr/>
-              <a:t>1/22/2017</a:t>
+              <a:t>1/26/2017</a:t>
             </a:fld>
             <a:endParaRPr lang="en-US"/>
           </a:p>
@@ -8154,7 +8178,7 @@
     </p:spTree>
     <p:extLst>
       <p:ext uri="{BB962C8B-B14F-4D97-AF65-F5344CB8AC3E}">
-        <p14:creationId xmlns:p14="http://schemas.microsoft.com/office/powerpoint/2010/main" val="2604561829"/>
+        <p14:creationId xmlns:p14="http://schemas.microsoft.com/office/powerpoint/2010/main" xmlns="" val="2604561829"/>
       </p:ext>
     </p:extLst>
   </p:cSld>
@@ -8274,7 +8298,7 @@
             <a:fld id="{DCCFA427-BB50-4F8D-8FC4-B0EA0BA5795C}" type="datetimeFigureOut">
               <a:rPr lang="en-US" smtClean="0"/>
               <a:pPr/>
-              <a:t>1/22/2017</a:t>
+              <a:t>1/26/2017</a:t>
             </a:fld>
             <a:endParaRPr lang="en-US"/>
           </a:p>
@@ -8326,7 +8350,7 @@
     </p:spTree>
     <p:extLst>
       <p:ext uri="{BB962C8B-B14F-4D97-AF65-F5344CB8AC3E}">
-        <p14:creationId xmlns:p14="http://schemas.microsoft.com/office/powerpoint/2010/main" val="2263785529"/>
+        <p14:creationId xmlns:p14="http://schemas.microsoft.com/office/powerpoint/2010/main" xmlns="" val="2263785529"/>
       </p:ext>
     </p:extLst>
   </p:cSld>
@@ -8847,7 +8871,7 @@
             <a:fld id="{DCCFA427-BB50-4F8D-8FC4-B0EA0BA5795C}" type="datetimeFigureOut">
               <a:rPr lang="en-US" smtClean="0"/>
               <a:pPr/>
-              <a:t>1/22/2017</a:t>
+              <a:t>1/26/2017</a:t>
             </a:fld>
             <a:endParaRPr lang="en-US"/>
           </a:p>
@@ -8913,7 +8937,7 @@
     </p:spTree>
     <p:extLst>
       <p:ext uri="{BB962C8B-B14F-4D97-AF65-F5344CB8AC3E}">
-        <p14:creationId xmlns:p14="http://schemas.microsoft.com/office/powerpoint/2010/main" val="1591096940"/>
+        <p14:creationId xmlns:p14="http://schemas.microsoft.com/office/powerpoint/2010/main" xmlns="" val="1591096940"/>
       </p:ext>
     </p:extLst>
   </p:cSld>
@@ -9151,7 +9175,7 @@
             <a:fld id="{DCCFA427-BB50-4F8D-8FC4-B0EA0BA5795C}" type="datetimeFigureOut">
               <a:rPr lang="en-US" smtClean="0"/>
               <a:pPr/>
-              <a:t>1/22/2017</a:t>
+              <a:t>1/26/2017</a:t>
             </a:fld>
             <a:endParaRPr lang="en-US"/>
           </a:p>
@@ -9203,7 +9227,7 @@
     </p:spTree>
     <p:extLst>
       <p:ext uri="{BB962C8B-B14F-4D97-AF65-F5344CB8AC3E}">
-        <p14:creationId xmlns:p14="http://schemas.microsoft.com/office/powerpoint/2010/main" val="4104223766"/>
+        <p14:creationId xmlns:p14="http://schemas.microsoft.com/office/powerpoint/2010/main" xmlns="" val="4104223766"/>
       </p:ext>
     </p:extLst>
   </p:cSld>
@@ -9590,7 +9614,7 @@
             <a:fld id="{DCCFA427-BB50-4F8D-8FC4-B0EA0BA5795C}" type="datetimeFigureOut">
               <a:rPr lang="en-US" smtClean="0"/>
               <a:pPr/>
-              <a:t>1/22/2017</a:t>
+              <a:t>1/26/2017</a:t>
             </a:fld>
             <a:endParaRPr lang="en-US"/>
           </a:p>
@@ -9642,7 +9666,7 @@
     </p:spTree>
     <p:extLst>
       <p:ext uri="{BB962C8B-B14F-4D97-AF65-F5344CB8AC3E}">
-        <p14:creationId xmlns:p14="http://schemas.microsoft.com/office/powerpoint/2010/main" val="2670169739"/>
+        <p14:creationId xmlns:p14="http://schemas.microsoft.com/office/powerpoint/2010/main" xmlns="" val="2670169739"/>
       </p:ext>
     </p:extLst>
   </p:cSld>
@@ -9710,7 +9734,7 @@
             <a:fld id="{DCCFA427-BB50-4F8D-8FC4-B0EA0BA5795C}" type="datetimeFigureOut">
               <a:rPr lang="en-US" smtClean="0"/>
               <a:pPr/>
-              <a:t>1/22/2017</a:t>
+              <a:t>1/26/2017</a:t>
             </a:fld>
             <a:endParaRPr lang="en-US"/>
           </a:p>
@@ -9762,7 +9786,7 @@
     </p:spTree>
     <p:extLst>
       <p:ext uri="{BB962C8B-B14F-4D97-AF65-F5344CB8AC3E}">
-        <p14:creationId xmlns:p14="http://schemas.microsoft.com/office/powerpoint/2010/main" val="1477665264"/>
+        <p14:creationId xmlns:p14="http://schemas.microsoft.com/office/powerpoint/2010/main" xmlns="" val="1477665264"/>
       </p:ext>
     </p:extLst>
   </p:cSld>
@@ -9807,7 +9831,7 @@
             <a:fld id="{DCCFA427-BB50-4F8D-8FC4-B0EA0BA5795C}" type="datetimeFigureOut">
               <a:rPr lang="en-US" smtClean="0"/>
               <a:pPr/>
-              <a:t>1/22/2017</a:t>
+              <a:t>1/26/2017</a:t>
             </a:fld>
             <a:endParaRPr lang="en-US"/>
           </a:p>
@@ -9859,7 +9883,7 @@
     </p:spTree>
     <p:extLst>
       <p:ext uri="{BB962C8B-B14F-4D97-AF65-F5344CB8AC3E}">
-        <p14:creationId xmlns:p14="http://schemas.microsoft.com/office/powerpoint/2010/main" val="2711781868"/>
+        <p14:creationId xmlns:p14="http://schemas.microsoft.com/office/powerpoint/2010/main" xmlns="" val="2711781868"/>
       </p:ext>
     </p:extLst>
   </p:cSld>
@@ -10191,7 +10215,7 @@
             <a:fld id="{DCCFA427-BB50-4F8D-8FC4-B0EA0BA5795C}" type="datetimeFigureOut">
               <a:rPr lang="en-US" smtClean="0"/>
               <a:pPr/>
-              <a:t>1/22/2017</a:t>
+              <a:t>1/26/2017</a:t>
             </a:fld>
             <a:endParaRPr lang="en-US"/>
           </a:p>
@@ -10299,7 +10323,7 @@
     </p:spTree>
     <p:extLst>
       <p:ext uri="{BB962C8B-B14F-4D97-AF65-F5344CB8AC3E}">
-        <p14:creationId xmlns:p14="http://schemas.microsoft.com/office/powerpoint/2010/main" val="1977218180"/>
+        <p14:creationId xmlns:p14="http://schemas.microsoft.com/office/powerpoint/2010/main" xmlns="" val="1977218180"/>
       </p:ext>
     </p:extLst>
   </p:cSld>
@@ -10587,7 +10611,7 @@
             <a:fld id="{DCCFA427-BB50-4F8D-8FC4-B0EA0BA5795C}" type="datetimeFigureOut">
               <a:rPr lang="en-US" smtClean="0"/>
               <a:pPr/>
-              <a:t>1/22/2017</a:t>
+              <a:t>1/26/2017</a:t>
             </a:fld>
             <a:endParaRPr lang="en-US"/>
           </a:p>
@@ -10709,7 +10733,7 @@
     </p:spTree>
     <p:extLst>
       <p:ext uri="{BB962C8B-B14F-4D97-AF65-F5344CB8AC3E}">
-        <p14:creationId xmlns:p14="http://schemas.microsoft.com/office/powerpoint/2010/main" val="2602728310"/>
+        <p14:creationId xmlns:p14="http://schemas.microsoft.com/office/powerpoint/2010/main" xmlns="" val="2602728310"/>
       </p:ext>
     </p:extLst>
   </p:cSld>
@@ -10902,7 +10926,7 @@
             <a:fld id="{DCCFA427-BB50-4F8D-8FC4-B0EA0BA5795C}" type="datetimeFigureOut">
               <a:rPr lang="en-US" smtClean="0"/>
               <a:pPr/>
-              <a:t>1/22/2017</a:t>
+              <a:t>1/26/2017</a:t>
             </a:fld>
             <a:endParaRPr lang="en-US"/>
           </a:p>
@@ -10992,7 +11016,7 @@
     </p:spTree>
     <p:extLst>
       <p:ext uri="{BB962C8B-B14F-4D97-AF65-F5344CB8AC3E}">
-        <p14:creationId xmlns:p14="http://schemas.microsoft.com/office/powerpoint/2010/main" val="4097071133"/>
+        <p14:creationId xmlns:p14="http://schemas.microsoft.com/office/powerpoint/2010/main" xmlns="" val="4097071133"/>
       </p:ext>
     </p:extLst>
   </p:cSld>
@@ -11477,7 +11501,7 @@
     </p:spTree>
     <p:extLst>
       <p:ext uri="{BB962C8B-B14F-4D97-AF65-F5344CB8AC3E}">
-        <p14:creationId xmlns:p14="http://schemas.microsoft.com/office/powerpoint/2010/main" val="3364559204"/>
+        <p14:creationId xmlns:p14="http://schemas.microsoft.com/office/powerpoint/2010/main" xmlns="" val="3364559204"/>
       </p:ext>
     </p:extLst>
   </p:cSld>
@@ -11546,7 +11570,9 @@
         </p:nvSpPr>
         <p:spPr/>
         <p:txBody>
-          <a:bodyPr/>
+          <a:bodyPr>
+            <a:normAutofit lnSpcReduction="10000"/>
+          </a:bodyPr>
           <a:lstStyle/>
           <a:p>
             <a:r>
@@ -11563,20 +11589,81 @@
           <a:p>
             <a:r>
               <a:rPr lang="en-US" dirty="0" smtClean="0"/>
-              <a:t>Mostly trivial important features, such as employment ratio</a:t>
-            </a:r>
-          </a:p>
-          <a:p>
+              <a:t>Mostly trivial important features, such as employment </a:t>
+            </a:r>
             <a:r>
               <a:rPr lang="en-US" dirty="0" smtClean="0"/>
-              <a:t>Non trivial feature: </a:t>
-            </a:r>
-          </a:p>
-          <a:p>
-            <a:pPr>
-              <a:buNone/>
-            </a:pPr>
-            <a:endParaRPr lang="he-IL" dirty="0"/>
+              <a:t>ratio, </a:t>
+            </a:r>
+          </a:p>
+          <a:p>
+            <a:r>
+              <a:rPr lang="en-US" dirty="0" smtClean="0"/>
+              <a:t>Country differences</a:t>
+            </a:r>
+            <a:endParaRPr lang="en-US" dirty="0" smtClean="0"/>
+          </a:p>
+          <a:p>
+            <a:r>
+              <a:rPr lang="en-US" dirty="0" smtClean="0"/>
+              <a:t>Non trivial </a:t>
+            </a:r>
+            <a:r>
+              <a:rPr lang="en-US" dirty="0" smtClean="0"/>
+              <a:t>features:</a:t>
+            </a:r>
+          </a:p>
+          <a:p>
+            <a:endParaRPr lang="en-US" dirty="0" smtClean="0"/>
+          </a:p>
+          <a:p>
+            <a:endParaRPr lang="en-US" dirty="0" smtClean="0"/>
+          </a:p>
+          <a:p>
+            <a:endParaRPr lang="en-US" dirty="0" smtClean="0"/>
+          </a:p>
+          <a:p>
+            <a:endParaRPr lang="en-US" dirty="0" smtClean="0"/>
+          </a:p>
+          <a:p>
+            <a:r>
+              <a:rPr lang="en-US" sz="1200" dirty="0" smtClean="0">
+                <a:hlinkClick r:id="rId2"/>
+              </a:rPr>
+              <a:t>http</a:t>
+            </a:r>
+            <a:r>
+              <a:rPr lang="en-US" sz="1200" dirty="0" smtClean="0">
+                <a:hlinkClick r:id="rId2"/>
+              </a:rPr>
+              <a:t>://</a:t>
+            </a:r>
+            <a:r>
+              <a:rPr lang="en-US" sz="1200" dirty="0" smtClean="0">
+                <a:hlinkClick r:id="rId2"/>
+              </a:rPr>
+              <a:t>data.worldbank.org/indicator/SP.ADO.TFRT</a:t>
+            </a:r>
+            <a:endParaRPr lang="en-US" sz="1200" dirty="0" smtClean="0"/>
+          </a:p>
+          <a:p>
+            <a:r>
+              <a:rPr lang="en-US" sz="1200" dirty="0" smtClean="0">
+                <a:hlinkClick r:id="rId3"/>
+              </a:rPr>
+              <a:t>http://</a:t>
+            </a:r>
+            <a:r>
+              <a:rPr lang="en-US" sz="1200" dirty="0" smtClean="0">
+                <a:hlinkClick r:id="rId3"/>
+              </a:rPr>
+              <a:t>data.worldbank.org/indicator/SP.DYN.IMRT.IN</a:t>
+            </a:r>
+            <a:r>
+              <a:rPr lang="en-US" sz="1200" dirty="0" smtClean="0"/>
+              <a:t> </a:t>
+            </a:r>
+            <a:endParaRPr lang="en-US" sz="1200" dirty="0" smtClean="0"/>
           </a:p>
         </p:txBody>
       </p:sp>
@@ -11588,7 +11675,7 @@
         </p:nvGrpSpPr>
         <p:grpSpPr>
           <a:xfrm>
-            <a:off x="3608204" y="3328074"/>
+            <a:off x="3493904" y="3554490"/>
             <a:ext cx="5815912" cy="247411"/>
             <a:chOff x="2092412" y="3393978"/>
             <a:chExt cx="5815912" cy="247411"/>
@@ -11603,7 +11690,7 @@
             <p:nvPr/>
           </p:nvPicPr>
           <p:blipFill>
-            <a:blip r:embed="rId2" cstate="print"/>
+            <a:blip r:embed="rId4" cstate="print"/>
             <a:stretch>
               <a:fillRect/>
             </a:stretch>
@@ -11627,7 +11714,7 @@
             <p:nvPr/>
           </p:nvPicPr>
           <p:blipFill>
-            <a:blip r:embed="rId3" cstate="print"/>
+            <a:blip r:embed="rId5" cstate="print"/>
             <a:stretch>
               <a:fillRect/>
             </a:stretch>
@@ -11643,6 +11730,78 @@
           </p:spPr>
         </p:pic>
       </p:grpSp>
+      <p:pic>
+        <p:nvPicPr>
+          <p:cNvPr id="8" name="תמונה 7" descr="kkkk.PNG"/>
+          <p:cNvPicPr>
+            <a:picLocks noChangeAspect="1"/>
+          </p:cNvPicPr>
+          <p:nvPr/>
+        </p:nvPicPr>
+        <p:blipFill>
+          <a:blip r:embed="rId6" cstate="print"/>
+          <a:stretch>
+            <a:fillRect/>
+          </a:stretch>
+        </p:blipFill>
+        <p:spPr>
+          <a:xfrm>
+            <a:off x="3497043" y="3801002"/>
+            <a:ext cx="5806978" cy="89545"/>
+          </a:xfrm>
+          <a:prstGeom prst="rect">
+            <a:avLst/>
+          </a:prstGeom>
+        </p:spPr>
+      </p:pic>
+      <p:pic>
+        <p:nvPicPr>
+          <p:cNvPr id="9" name="תמונה 8" descr="sdf.PNG"/>
+          <p:cNvPicPr>
+            <a:picLocks noChangeAspect="1"/>
+          </p:cNvPicPr>
+          <p:nvPr/>
+        </p:nvPicPr>
+        <p:blipFill>
+          <a:blip r:embed="rId7" cstate="print"/>
+          <a:stretch>
+            <a:fillRect/>
+          </a:stretch>
+        </p:blipFill>
+        <p:spPr>
+          <a:xfrm>
+            <a:off x="8971110" y="4075611"/>
+            <a:ext cx="2974211" cy="2533037"/>
+          </a:xfrm>
+          <a:prstGeom prst="rect">
+            <a:avLst/>
+          </a:prstGeom>
+        </p:spPr>
+      </p:pic>
+      <p:pic>
+        <p:nvPicPr>
+          <p:cNvPr id="10" name="תמונה 9" descr="asdasd.PNG"/>
+          <p:cNvPicPr>
+            <a:picLocks noChangeAspect="1"/>
+          </p:cNvPicPr>
+          <p:nvPr/>
+        </p:nvPicPr>
+        <p:blipFill>
+          <a:blip r:embed="rId8" cstate="print"/>
+          <a:stretch>
+            <a:fillRect/>
+          </a:stretch>
+        </p:blipFill>
+        <p:spPr>
+          <a:xfrm>
+            <a:off x="6139542" y="4075293"/>
+            <a:ext cx="2807545" cy="2531470"/>
+          </a:xfrm>
+          <a:prstGeom prst="rect">
+            <a:avLst/>
+          </a:prstGeom>
+        </p:spPr>
+      </p:pic>
     </p:spTree>
   </p:cSld>
   <p:clrMapOvr>
@@ -11651,7 +11810,510 @@
   <p:timing>
     <p:tnLst>
       <p:par>
-        <p:cTn id="1" dur="indefinite" restart="never" nodeType="tmRoot"/>
+        <p:cTn id="1" dur="indefinite" restart="never" nodeType="tmRoot">
+          <p:childTnLst>
+            <p:seq concurrent="1" nextAc="seek">
+              <p:cTn id="2" dur="indefinite" nodeType="mainSeq">
+                <p:childTnLst>
+                  <p:par>
+                    <p:cTn id="3" fill="hold">
+                      <p:stCondLst>
+                        <p:cond delay="indefinite"/>
+                        <p:cond evt="onBegin" delay="0">
+                          <p:tn val="2"/>
+                        </p:cond>
+                      </p:stCondLst>
+                      <p:childTnLst>
+                        <p:par>
+                          <p:cTn id="4" fill="hold">
+                            <p:stCondLst>
+                              <p:cond delay="0"/>
+                            </p:stCondLst>
+                            <p:childTnLst>
+                              <p:par>
+                                <p:cTn id="5" presetID="10" presetClass="entr" presetSubtype="0" fill="hold" nodeType="withEffect">
+                                  <p:stCondLst>
+                                    <p:cond delay="0"/>
+                                  </p:stCondLst>
+                                  <p:childTnLst>
+                                    <p:set>
+                                      <p:cBhvr>
+                                        <p:cTn id="6" dur="1" fill="hold">
+                                          <p:stCondLst>
+                                            <p:cond delay="0"/>
+                                          </p:stCondLst>
+                                        </p:cTn>
+                                        <p:tgtEl>
+                                          <p:spTgt spid="3">
+                                            <p:txEl>
+                                              <p:pRg st="0" end="0"/>
+                                            </p:txEl>
+                                          </p:spTgt>
+                                        </p:tgtEl>
+                                        <p:attrNameLst>
+                                          <p:attrName>style.visibility</p:attrName>
+                                        </p:attrNameLst>
+                                      </p:cBhvr>
+                                      <p:to>
+                                        <p:strVal val="visible"/>
+                                      </p:to>
+                                    </p:set>
+                                    <p:animEffect transition="in" filter="fade">
+                                      <p:cBhvr>
+                                        <p:cTn id="7" dur="2000"/>
+                                        <p:tgtEl>
+                                          <p:spTgt spid="3">
+                                            <p:txEl>
+                                              <p:pRg st="0" end="0"/>
+                                            </p:txEl>
+                                          </p:spTgt>
+                                        </p:tgtEl>
+                                      </p:cBhvr>
+                                    </p:animEffect>
+                                  </p:childTnLst>
+                                </p:cTn>
+                              </p:par>
+                              <p:par>
+                                <p:cTn id="8" presetID="10" presetClass="entr" presetSubtype="0" fill="hold" nodeType="withEffect">
+                                  <p:stCondLst>
+                                    <p:cond delay="0"/>
+                                  </p:stCondLst>
+                                  <p:childTnLst>
+                                    <p:set>
+                                      <p:cBhvr>
+                                        <p:cTn id="9" dur="1" fill="hold">
+                                          <p:stCondLst>
+                                            <p:cond delay="0"/>
+                                          </p:stCondLst>
+                                        </p:cTn>
+                                        <p:tgtEl>
+                                          <p:spTgt spid="3">
+                                            <p:txEl>
+                                              <p:pRg st="1" end="1"/>
+                                            </p:txEl>
+                                          </p:spTgt>
+                                        </p:tgtEl>
+                                        <p:attrNameLst>
+                                          <p:attrName>style.visibility</p:attrName>
+                                        </p:attrNameLst>
+                                      </p:cBhvr>
+                                      <p:to>
+                                        <p:strVal val="visible"/>
+                                      </p:to>
+                                    </p:set>
+                                    <p:animEffect transition="in" filter="fade">
+                                      <p:cBhvr>
+                                        <p:cTn id="10" dur="2000"/>
+                                        <p:tgtEl>
+                                          <p:spTgt spid="3">
+                                            <p:txEl>
+                                              <p:pRg st="1" end="1"/>
+                                            </p:txEl>
+                                          </p:spTgt>
+                                        </p:tgtEl>
+                                      </p:cBhvr>
+                                    </p:animEffect>
+                                  </p:childTnLst>
+                                </p:cTn>
+                              </p:par>
+                              <p:par>
+                                <p:cTn id="11" presetID="10" presetClass="entr" presetSubtype="0" fill="hold" nodeType="withEffect">
+                                  <p:stCondLst>
+                                    <p:cond delay="0"/>
+                                  </p:stCondLst>
+                                  <p:childTnLst>
+                                    <p:set>
+                                      <p:cBhvr>
+                                        <p:cTn id="12" dur="1" fill="hold">
+                                          <p:stCondLst>
+                                            <p:cond delay="0"/>
+                                          </p:stCondLst>
+                                        </p:cTn>
+                                        <p:tgtEl>
+                                          <p:spTgt spid="3">
+                                            <p:txEl>
+                                              <p:pRg st="2" end="2"/>
+                                            </p:txEl>
+                                          </p:spTgt>
+                                        </p:tgtEl>
+                                        <p:attrNameLst>
+                                          <p:attrName>style.visibility</p:attrName>
+                                        </p:attrNameLst>
+                                      </p:cBhvr>
+                                      <p:to>
+                                        <p:strVal val="visible"/>
+                                      </p:to>
+                                    </p:set>
+                                    <p:animEffect transition="in" filter="fade">
+                                      <p:cBhvr>
+                                        <p:cTn id="13" dur="2000"/>
+                                        <p:tgtEl>
+                                          <p:spTgt spid="3">
+                                            <p:txEl>
+                                              <p:pRg st="2" end="2"/>
+                                            </p:txEl>
+                                          </p:spTgt>
+                                        </p:tgtEl>
+                                      </p:cBhvr>
+                                    </p:animEffect>
+                                  </p:childTnLst>
+                                </p:cTn>
+                              </p:par>
+                              <p:par>
+                                <p:cTn id="14" presetID="10" presetClass="entr" presetSubtype="0" fill="hold" nodeType="withEffect">
+                                  <p:stCondLst>
+                                    <p:cond delay="0"/>
+                                  </p:stCondLst>
+                                  <p:childTnLst>
+                                    <p:set>
+                                      <p:cBhvr>
+                                        <p:cTn id="15" dur="1" fill="hold">
+                                          <p:stCondLst>
+                                            <p:cond delay="0"/>
+                                          </p:stCondLst>
+                                        </p:cTn>
+                                        <p:tgtEl>
+                                          <p:spTgt spid="3">
+                                            <p:txEl>
+                                              <p:pRg st="3" end="3"/>
+                                            </p:txEl>
+                                          </p:spTgt>
+                                        </p:tgtEl>
+                                        <p:attrNameLst>
+                                          <p:attrName>style.visibility</p:attrName>
+                                        </p:attrNameLst>
+                                      </p:cBhvr>
+                                      <p:to>
+                                        <p:strVal val="visible"/>
+                                      </p:to>
+                                    </p:set>
+                                    <p:animEffect transition="in" filter="fade">
+                                      <p:cBhvr>
+                                        <p:cTn id="16" dur="2000"/>
+                                        <p:tgtEl>
+                                          <p:spTgt spid="3">
+                                            <p:txEl>
+                                              <p:pRg st="3" end="3"/>
+                                            </p:txEl>
+                                          </p:spTgt>
+                                        </p:tgtEl>
+                                      </p:cBhvr>
+                                    </p:animEffect>
+                                  </p:childTnLst>
+                                </p:cTn>
+                              </p:par>
+                              <p:par>
+                                <p:cTn id="17" presetID="10" presetClass="entr" presetSubtype="0" fill="hold" nodeType="withEffect">
+                                  <p:stCondLst>
+                                    <p:cond delay="0"/>
+                                  </p:stCondLst>
+                                  <p:childTnLst>
+                                    <p:set>
+                                      <p:cBhvr>
+                                        <p:cTn id="18" dur="1" fill="hold">
+                                          <p:stCondLst>
+                                            <p:cond delay="0"/>
+                                          </p:stCondLst>
+                                        </p:cTn>
+                                        <p:tgtEl>
+                                          <p:spTgt spid="3">
+                                            <p:txEl>
+                                              <p:pRg st="4" end="4"/>
+                                            </p:txEl>
+                                          </p:spTgt>
+                                        </p:tgtEl>
+                                        <p:attrNameLst>
+                                          <p:attrName>style.visibility</p:attrName>
+                                        </p:attrNameLst>
+                                      </p:cBhvr>
+                                      <p:to>
+                                        <p:strVal val="visible"/>
+                                      </p:to>
+                                    </p:set>
+                                    <p:animEffect transition="in" filter="fade">
+                                      <p:cBhvr>
+                                        <p:cTn id="19" dur="2000"/>
+                                        <p:tgtEl>
+                                          <p:spTgt spid="3">
+                                            <p:txEl>
+                                              <p:pRg st="4" end="4"/>
+                                            </p:txEl>
+                                          </p:spTgt>
+                                        </p:tgtEl>
+                                      </p:cBhvr>
+                                    </p:animEffect>
+                                  </p:childTnLst>
+                                </p:cTn>
+                              </p:par>
+                              <p:par>
+                                <p:cTn id="20" presetID="10" presetClass="entr" presetSubtype="0" fill="hold" nodeType="withEffect">
+                                  <p:stCondLst>
+                                    <p:cond delay="0"/>
+                                  </p:stCondLst>
+                                  <p:childTnLst>
+                                    <p:set>
+                                      <p:cBhvr>
+                                        <p:cTn id="21" dur="1" fill="hold">
+                                          <p:stCondLst>
+                                            <p:cond delay="0"/>
+                                          </p:stCondLst>
+                                        </p:cTn>
+                                        <p:tgtEl>
+                                          <p:spTgt spid="8"/>
+                                        </p:tgtEl>
+                                        <p:attrNameLst>
+                                          <p:attrName>style.visibility</p:attrName>
+                                        </p:attrNameLst>
+                                      </p:cBhvr>
+                                      <p:to>
+                                        <p:strVal val="visible"/>
+                                      </p:to>
+                                    </p:set>
+                                    <p:animEffect transition="in" filter="fade">
+                                      <p:cBhvr>
+                                        <p:cTn id="22" dur="2000"/>
+                                        <p:tgtEl>
+                                          <p:spTgt spid="8"/>
+                                        </p:tgtEl>
+                                      </p:cBhvr>
+                                    </p:animEffect>
+                                  </p:childTnLst>
+                                </p:cTn>
+                              </p:par>
+                              <p:par>
+                                <p:cTn id="23" presetID="10" presetClass="entr" presetSubtype="0" fill="hold" nodeType="withEffect">
+                                  <p:stCondLst>
+                                    <p:cond delay="0"/>
+                                  </p:stCondLst>
+                                  <p:childTnLst>
+                                    <p:set>
+                                      <p:cBhvr>
+                                        <p:cTn id="24" dur="1" fill="hold">
+                                          <p:stCondLst>
+                                            <p:cond delay="0"/>
+                                          </p:stCondLst>
+                                        </p:cTn>
+                                        <p:tgtEl>
+                                          <p:spTgt spid="7"/>
+                                        </p:tgtEl>
+                                        <p:attrNameLst>
+                                          <p:attrName>style.visibility</p:attrName>
+                                        </p:attrNameLst>
+                                      </p:cBhvr>
+                                      <p:to>
+                                        <p:strVal val="visible"/>
+                                      </p:to>
+                                    </p:set>
+                                    <p:animEffect transition="in" filter="fade">
+                                      <p:cBhvr>
+                                        <p:cTn id="25" dur="2000"/>
+                                        <p:tgtEl>
+                                          <p:spTgt spid="7"/>
+                                        </p:tgtEl>
+                                      </p:cBhvr>
+                                    </p:animEffect>
+                                  </p:childTnLst>
+                                </p:cTn>
+                              </p:par>
+                            </p:childTnLst>
+                          </p:cTn>
+                        </p:par>
+                      </p:childTnLst>
+                    </p:cTn>
+                  </p:par>
+                  <p:par>
+                    <p:cTn id="26" fill="hold">
+                      <p:stCondLst>
+                        <p:cond delay="indefinite"/>
+                      </p:stCondLst>
+                      <p:childTnLst>
+                        <p:par>
+                          <p:cTn id="27" fill="hold">
+                            <p:stCondLst>
+                              <p:cond delay="0"/>
+                            </p:stCondLst>
+                            <p:childTnLst>
+                              <p:par>
+                                <p:cTn id="28" presetID="10" presetClass="entr" presetSubtype="0" fill="hold" nodeType="clickEffect">
+                                  <p:stCondLst>
+                                    <p:cond delay="0"/>
+                                  </p:stCondLst>
+                                  <p:childTnLst>
+                                    <p:set>
+                                      <p:cBhvr>
+                                        <p:cTn id="29" dur="1" fill="hold">
+                                          <p:stCondLst>
+                                            <p:cond delay="0"/>
+                                          </p:stCondLst>
+                                        </p:cTn>
+                                        <p:tgtEl>
+                                          <p:spTgt spid="3">
+                                            <p:txEl>
+                                              <p:pRg st="9" end="9"/>
+                                            </p:txEl>
+                                          </p:spTgt>
+                                        </p:tgtEl>
+                                        <p:attrNameLst>
+                                          <p:attrName>style.visibility</p:attrName>
+                                        </p:attrNameLst>
+                                      </p:cBhvr>
+                                      <p:to>
+                                        <p:strVal val="visible"/>
+                                      </p:to>
+                                    </p:set>
+                                    <p:animEffect transition="in" filter="fade">
+                                      <p:cBhvr>
+                                        <p:cTn id="30" dur="2000"/>
+                                        <p:tgtEl>
+                                          <p:spTgt spid="3">
+                                            <p:txEl>
+                                              <p:pRg st="9" end="9"/>
+                                            </p:txEl>
+                                          </p:spTgt>
+                                        </p:tgtEl>
+                                      </p:cBhvr>
+                                    </p:animEffect>
+                                  </p:childTnLst>
+                                </p:cTn>
+                              </p:par>
+                              <p:par>
+                                <p:cTn id="31" presetID="10" presetClass="entr" presetSubtype="0" fill="hold" nodeType="withEffect">
+                                  <p:stCondLst>
+                                    <p:cond delay="0"/>
+                                  </p:stCondLst>
+                                  <p:childTnLst>
+                                    <p:set>
+                                      <p:cBhvr>
+                                        <p:cTn id="32" dur="1" fill="hold">
+                                          <p:stCondLst>
+                                            <p:cond delay="0"/>
+                                          </p:stCondLst>
+                                        </p:cTn>
+                                        <p:tgtEl>
+                                          <p:spTgt spid="3">
+                                            <p:txEl>
+                                              <p:pRg st="10" end="10"/>
+                                            </p:txEl>
+                                          </p:spTgt>
+                                        </p:tgtEl>
+                                        <p:attrNameLst>
+                                          <p:attrName>style.visibility</p:attrName>
+                                        </p:attrNameLst>
+                                      </p:cBhvr>
+                                      <p:to>
+                                        <p:strVal val="visible"/>
+                                      </p:to>
+                                    </p:set>
+                                    <p:animEffect transition="in" filter="fade">
+                                      <p:cBhvr>
+                                        <p:cTn id="33" dur="2000"/>
+                                        <p:tgtEl>
+                                          <p:spTgt spid="3">
+                                            <p:txEl>
+                                              <p:pRg st="10" end="10"/>
+                                            </p:txEl>
+                                          </p:spTgt>
+                                        </p:tgtEl>
+                                      </p:cBhvr>
+                                    </p:animEffect>
+                                  </p:childTnLst>
+                                </p:cTn>
+                              </p:par>
+                              <p:par>
+                                <p:cTn id="34" presetID="21" presetClass="entr" presetSubtype="4" fill="hold" nodeType="withEffect">
+                                  <p:stCondLst>
+                                    <p:cond delay="0"/>
+                                  </p:stCondLst>
+                                  <p:childTnLst>
+                                    <p:set>
+                                      <p:cBhvr>
+                                        <p:cTn id="35" dur="1" fill="hold">
+                                          <p:stCondLst>
+                                            <p:cond delay="0"/>
+                                          </p:stCondLst>
+                                        </p:cTn>
+                                        <p:tgtEl>
+                                          <p:spTgt spid="10"/>
+                                        </p:tgtEl>
+                                        <p:attrNameLst>
+                                          <p:attrName>style.visibility</p:attrName>
+                                        </p:attrNameLst>
+                                      </p:cBhvr>
+                                      <p:to>
+                                        <p:strVal val="visible"/>
+                                      </p:to>
+                                    </p:set>
+                                    <p:animEffect transition="in" filter="wheel(4)">
+                                      <p:cBhvr>
+                                        <p:cTn id="36" dur="1000"/>
+                                        <p:tgtEl>
+                                          <p:spTgt spid="10"/>
+                                        </p:tgtEl>
+                                      </p:cBhvr>
+                                    </p:animEffect>
+                                  </p:childTnLst>
+                                </p:cTn>
+                              </p:par>
+                              <p:par>
+                                <p:cTn id="37" presetID="21" presetClass="entr" presetSubtype="4" fill="hold" nodeType="withEffect">
+                                  <p:stCondLst>
+                                    <p:cond delay="0"/>
+                                  </p:stCondLst>
+                                  <p:childTnLst>
+                                    <p:set>
+                                      <p:cBhvr>
+                                        <p:cTn id="38" dur="1" fill="hold">
+                                          <p:stCondLst>
+                                            <p:cond delay="0"/>
+                                          </p:stCondLst>
+                                        </p:cTn>
+                                        <p:tgtEl>
+                                          <p:spTgt spid="9"/>
+                                        </p:tgtEl>
+                                        <p:attrNameLst>
+                                          <p:attrName>style.visibility</p:attrName>
+                                        </p:attrNameLst>
+                                      </p:cBhvr>
+                                      <p:to>
+                                        <p:strVal val="visible"/>
+                                      </p:to>
+                                    </p:set>
+                                    <p:animEffect transition="in" filter="wheel(4)">
+                                      <p:cBhvr>
+                                        <p:cTn id="39" dur="1000"/>
+                                        <p:tgtEl>
+                                          <p:spTgt spid="9"/>
+                                        </p:tgtEl>
+                                      </p:cBhvr>
+                                    </p:animEffect>
+                                  </p:childTnLst>
+                                </p:cTn>
+                              </p:par>
+                            </p:childTnLst>
+                          </p:cTn>
+                        </p:par>
+                      </p:childTnLst>
+                    </p:cTn>
+                  </p:par>
+                </p:childTnLst>
+              </p:cTn>
+              <p:prevCondLst>
+                <p:cond evt="onPrev" delay="0">
+                  <p:tgtEl>
+                    <p:sldTgt/>
+                  </p:tgtEl>
+                </p:cond>
+              </p:prevCondLst>
+              <p:nextCondLst>
+                <p:cond evt="onNext" delay="0">
+                  <p:tgtEl>
+                    <p:sldTgt/>
+                  </p:tgtEl>
+                </p:cond>
+              </p:nextCondLst>
+            </p:seq>
+          </p:childTnLst>
+        </p:cTn>
       </p:par>
     </p:tnLst>
   </p:timing>
@@ -11723,6 +12385,34 @@
           <a:p>
             <a:r>
               <a:rPr lang="en-US" dirty="0" smtClean="0"/>
+              <a:t>2 </a:t>
+            </a:r>
+            <a:r>
+              <a:rPr lang="en-US" dirty="0" smtClean="0"/>
+              <a:t>methods</a:t>
+            </a:r>
+          </a:p>
+          <a:p>
+            <a:pPr lvl="1"/>
+            <a:r>
+              <a:rPr lang="en-US" dirty="0" smtClean="0"/>
+              <a:t>First: fill 2016 country vectors, and average the predictions</a:t>
+            </a:r>
+          </a:p>
+          <a:p>
+            <a:pPr lvl="1"/>
+            <a:r>
+              <a:rPr lang="en-US" dirty="0" smtClean="0"/>
+              <a:t>Second: fill next wage </a:t>
+            </a:r>
+            <a:r>
+              <a:rPr lang="en-US" dirty="0" smtClean="0"/>
+              <a:t>gap</a:t>
+            </a:r>
+          </a:p>
+          <a:p>
+            <a:r>
+              <a:rPr lang="en-US" dirty="0" smtClean="0"/>
               <a:t>2 ways of filling next values: </a:t>
             </a:r>
             <a:r>
@@ -11731,28 +12421,13 @@
             </a:r>
             <a:r>
               <a:rPr lang="en-US" dirty="0" smtClean="0"/>
-              <a:t> order 1,2</a:t>
-            </a:r>
-          </a:p>
-          <a:p>
+              <a:t> order </a:t>
+            </a:r>
             <a:r>
               <a:rPr lang="en-US" dirty="0" smtClean="0"/>
-              <a:t>2 methods</a:t>
-            </a:r>
-          </a:p>
-          <a:p>
-            <a:pPr lvl="1"/>
-            <a:r>
-              <a:rPr lang="en-US" dirty="0" smtClean="0"/>
-              <a:t>First: fill 2016 country vectors, and average the predictions</a:t>
-            </a:r>
-          </a:p>
-          <a:p>
-            <a:pPr lvl="1"/>
-            <a:r>
-              <a:rPr lang="en-US" dirty="0" smtClean="0"/>
-              <a:t>Second: fill next wage gap</a:t>
-            </a:r>
+              <a:t>1,2</a:t>
+            </a:r>
+            <a:endParaRPr lang="en-US" dirty="0" smtClean="0"/>
           </a:p>
           <a:p>
             <a:r>
@@ -11971,7 +12646,7 @@
     </p:spTree>
     <p:extLst>
       <p:ext uri="{BB962C8B-B14F-4D97-AF65-F5344CB8AC3E}">
-        <p14:creationId xmlns:p14="http://schemas.microsoft.com/office/powerpoint/2010/main" val="2150587283"/>
+        <p14:creationId xmlns:p14="http://schemas.microsoft.com/office/powerpoint/2010/main" xmlns="" val="2150587283"/>
       </p:ext>
     </p:extLst>
   </p:cSld>
@@ -12163,33 +12838,15 @@
                                   </p:childTnLst>
                                 </p:cTn>
                               </p:par>
-                            </p:childTnLst>
-                          </p:cTn>
-                        </p:par>
-                      </p:childTnLst>
-                    </p:cTn>
-                  </p:par>
-                  <p:par>
-                    <p:cTn id="18" fill="hold">
-                      <p:stCondLst>
-                        <p:cond delay="indefinite"/>
-                      </p:stCondLst>
-                      <p:childTnLst>
-                        <p:par>
-                          <p:cTn id="19" fill="hold">
-                            <p:stCondLst>
-                              <p:cond delay="0"/>
-                            </p:stCondLst>
-                            <p:childTnLst>
                               <p:par>
-                                <p:cTn id="20" presetID="10" presetClass="entr" presetSubtype="0" fill="hold" nodeType="clickEffect">
+                                <p:cTn id="18" presetID="10" presetClass="entr" presetSubtype="0" fill="hold" nodeType="withEffect">
                                   <p:stCondLst>
                                     <p:cond delay="0"/>
                                   </p:stCondLst>
                                   <p:childTnLst>
                                     <p:set>
                                       <p:cBhvr>
-                                        <p:cTn id="21" dur="1" fill="hold">
+                                        <p:cTn id="19" dur="1" fill="hold">
                                           <p:stCondLst>
                                             <p:cond delay="0"/>
                                           </p:stCondLst>
@@ -12211,7 +12868,7 @@
                                     </p:set>
                                     <p:animEffect transition="in" filter="fade">
                                       <p:cBhvr>
-                                        <p:cTn id="22" dur="500"/>
+                                        <p:cTn id="20" dur="500"/>
                                         <p:tgtEl>
                                           <p:spTgt spid="3">
                                             <p:txEl>
@@ -12231,26 +12888,26 @@
                     </p:cTn>
                   </p:par>
                   <p:par>
-                    <p:cTn id="23" fill="hold">
+                    <p:cTn id="21" fill="hold">
                       <p:stCondLst>
                         <p:cond delay="indefinite"/>
                       </p:stCondLst>
                       <p:childTnLst>
                         <p:par>
-                          <p:cTn id="24" fill="hold">
+                          <p:cTn id="22" fill="hold">
                             <p:stCondLst>
                               <p:cond delay="0"/>
                             </p:stCondLst>
                             <p:childTnLst>
                               <p:par>
-                                <p:cTn id="25" presetID="10" presetClass="entr" presetSubtype="0" fill="hold" nodeType="clickEffect">
+                                <p:cTn id="23" presetID="10" presetClass="entr" presetSubtype="0" fill="hold" nodeType="clickEffect">
                                   <p:stCondLst>
                                     <p:cond delay="0"/>
                                   </p:stCondLst>
                                   <p:childTnLst>
                                     <p:set>
                                       <p:cBhvr>
-                                        <p:cTn id="26" dur="1" fill="hold">
+                                        <p:cTn id="24" dur="1" fill="hold">
                                           <p:stCondLst>
                                             <p:cond delay="0"/>
                                           </p:stCondLst>
@@ -12272,7 +12929,7 @@
                                     </p:set>
                                     <p:animEffect transition="in" filter="fade">
                                       <p:cBhvr>
-                                        <p:cTn id="27" dur="500"/>
+                                        <p:cTn id="25" dur="500"/>
                                         <p:tgtEl>
                                           <p:spTgt spid="3">
                                             <p:txEl>
@@ -12286,14 +12943,14 @@
                                 </p:cTn>
                               </p:par>
                               <p:par>
-                                <p:cTn id="28" presetID="10" presetClass="entr" presetSubtype="0" fill="hold" nodeType="withEffect">
+                                <p:cTn id="26" presetID="10" presetClass="entr" presetSubtype="0" fill="hold" nodeType="withEffect">
                                   <p:stCondLst>
                                     <p:cond delay="0"/>
                                   </p:stCondLst>
                                   <p:childTnLst>
                                     <p:set>
                                       <p:cBhvr>
-                                        <p:cTn id="29" dur="1" fill="hold">
+                                        <p:cTn id="27" dur="1" fill="hold">
                                           <p:stCondLst>
                                             <p:cond delay="0"/>
                                           </p:stCondLst>
@@ -12315,7 +12972,7 @@
                                     </p:set>
                                     <p:animEffect transition="in" filter="fade">
                                       <p:cBhvr>
-                                        <p:cTn id="30" dur="500"/>
+                                        <p:cTn id="28" dur="500"/>
                                         <p:tgtEl>
                                           <p:spTgt spid="3">
                                             <p:txEl>
@@ -12335,26 +12992,26 @@
                     </p:cTn>
                   </p:par>
                   <p:par>
-                    <p:cTn id="31" fill="hold">
+                    <p:cTn id="29" fill="hold">
                       <p:stCondLst>
                         <p:cond delay="indefinite"/>
                       </p:stCondLst>
                       <p:childTnLst>
                         <p:par>
-                          <p:cTn id="32" fill="hold">
+                          <p:cTn id="30" fill="hold">
                             <p:stCondLst>
                               <p:cond delay="0"/>
                             </p:stCondLst>
                             <p:childTnLst>
                               <p:par>
-                                <p:cTn id="33" presetID="6" presetClass="entr" presetSubtype="16" fill="hold" nodeType="clickEffect">
+                                <p:cTn id="31" presetID="6" presetClass="entr" presetSubtype="16" fill="hold" nodeType="clickEffect">
                                   <p:stCondLst>
                                     <p:cond delay="0"/>
                                   </p:stCondLst>
                                   <p:childTnLst>
                                     <p:set>
                                       <p:cBhvr>
-                                        <p:cTn id="34" dur="1" fill="hold">
+                                        <p:cTn id="32" dur="1" fill="hold">
                                           <p:stCondLst>
                                             <p:cond delay="0"/>
                                           </p:stCondLst>
@@ -12372,7 +13029,7 @@
                                     </p:set>
                                     <p:animEffect transition="in" filter="circle(in)">
                                       <p:cBhvr>
-                                        <p:cTn id="35" dur="2000"/>
+                                        <p:cTn id="33" dur="2000"/>
                                         <p:tgtEl>
                                           <p:spTgt spid="5"/>
                                         </p:tgtEl>
@@ -12439,7 +13096,7 @@
             <p:ph idx="1"/>
             <p:extLst>
               <p:ext uri="{D42A27DB-BD31-4B8C-83A1-F6EECF244321}">
-                <p14:modId xmlns:p14="http://schemas.microsoft.com/office/powerpoint/2010/main" val="3792774229"/>
+                <p14:modId xmlns:p14="http://schemas.microsoft.com/office/powerpoint/2010/main" xmlns="" val="3792774229"/>
               </p:ext>
             </p:extLst>
           </p:nvPr>
@@ -12489,7 +13146,7 @@
     </p:spTree>
     <p:extLst>
       <p:ext uri="{BB962C8B-B14F-4D97-AF65-F5344CB8AC3E}">
-        <p14:creationId xmlns:p14="http://schemas.microsoft.com/office/powerpoint/2010/main" val="3798862902"/>
+        <p14:creationId xmlns:p14="http://schemas.microsoft.com/office/powerpoint/2010/main" xmlns="" val="3798862902"/>
       </p:ext>
     </p:extLst>
   </p:cSld>
@@ -12758,7 +13415,7 @@
     </p:spTree>
     <p:extLst>
       <p:ext uri="{BB962C8B-B14F-4D97-AF65-F5344CB8AC3E}">
-        <p14:creationId xmlns:p14="http://schemas.microsoft.com/office/powerpoint/2010/main" val="809872952"/>
+        <p14:creationId xmlns:p14="http://schemas.microsoft.com/office/powerpoint/2010/main" xmlns="" val="809872952"/>
       </p:ext>
     </p:extLst>
   </p:cSld>
@@ -12933,7 +13590,7 @@
     </p:spTree>
     <p:extLst>
       <p:ext uri="{BB962C8B-B14F-4D97-AF65-F5344CB8AC3E}">
-        <p14:creationId xmlns:p14="http://schemas.microsoft.com/office/powerpoint/2010/main" val="488657827"/>
+        <p14:creationId xmlns:p14="http://schemas.microsoft.com/office/powerpoint/2010/main" xmlns="" val="488657827"/>
       </p:ext>
     </p:extLst>
   </p:cSld>
@@ -13103,7 +13760,7 @@
     </p:spTree>
     <p:extLst>
       <p:ext uri="{BB962C8B-B14F-4D97-AF65-F5344CB8AC3E}">
-        <p14:creationId xmlns:p14="http://schemas.microsoft.com/office/powerpoint/2010/main" val="184644264"/>
+        <p14:creationId xmlns:p14="http://schemas.microsoft.com/office/powerpoint/2010/main" xmlns="" val="184644264"/>
       </p:ext>
     </p:extLst>
   </p:cSld>
@@ -13486,7 +14143,7 @@
     </p:spTree>
     <p:extLst>
       <p:ext uri="{BB962C8B-B14F-4D97-AF65-F5344CB8AC3E}">
-        <p14:creationId xmlns:p14="http://schemas.microsoft.com/office/powerpoint/2010/main" val="3021417476"/>
+        <p14:creationId xmlns:p14="http://schemas.microsoft.com/office/powerpoint/2010/main" xmlns="" val="3021417476"/>
       </p:ext>
     </p:extLst>
   </p:cSld>
@@ -13605,7 +14262,15 @@
             <a:pPr lvl="1"/>
             <a:r>
               <a:rPr lang="en-US" dirty="0" smtClean="0"/>
-              <a:t>Lasso (55, 25 countries) – removed year feature!</a:t>
+              <a:t>Lasso (55, </a:t>
+            </a:r>
+            <a:r>
+              <a:rPr lang="en-US" dirty="0" smtClean="0"/>
+              <a:t>24 </a:t>
+            </a:r>
+            <a:r>
+              <a:rPr lang="en-US" dirty="0" smtClean="0"/>
+              <a:t>countries) – removed year feature!</a:t>
             </a:r>
           </a:p>
           <a:p>
@@ -13632,7 +14297,7 @@
         </p:blipFill>
         <p:spPr>
           <a:xfrm>
-            <a:off x="7951449" y="3929999"/>
+            <a:off x="7977576" y="786204"/>
             <a:ext cx="3916777" cy="2619085"/>
           </a:xfrm>
           <a:prstGeom prst="rect">
@@ -13656,8 +14321,8 @@
         </p:blipFill>
         <p:spPr>
           <a:xfrm>
-            <a:off x="8478029" y="404231"/>
-            <a:ext cx="3374825" cy="2982877"/>
+            <a:off x="7985759" y="3582859"/>
+            <a:ext cx="3910637" cy="2982877"/>
           </a:xfrm>
           <a:prstGeom prst="rect">
             <a:avLst/>
@@ -13691,7 +14356,7 @@
     </p:spTree>
     <p:extLst>
       <p:ext uri="{BB962C8B-B14F-4D97-AF65-F5344CB8AC3E}">
-        <p14:creationId xmlns:p14="http://schemas.microsoft.com/office/powerpoint/2010/main" val="2991472870"/>
+        <p14:creationId xmlns:p14="http://schemas.microsoft.com/office/powerpoint/2010/main" xmlns="" val="2991472870"/>
       </p:ext>
     </p:extLst>
   </p:cSld>
@@ -13780,33 +14445,15 @@
                                   </p:childTnLst>
                                 </p:cTn>
                               </p:par>
-                            </p:childTnLst>
-                          </p:cTn>
-                        </p:par>
-                      </p:childTnLst>
-                    </p:cTn>
-                  </p:par>
-                  <p:par>
-                    <p:cTn id="9" fill="hold">
-                      <p:stCondLst>
-                        <p:cond delay="indefinite"/>
-                      </p:stCondLst>
-                      <p:childTnLst>
-                        <p:par>
-                          <p:cTn id="10" fill="hold">
-                            <p:stCondLst>
-                              <p:cond delay="0"/>
-                            </p:stCondLst>
-                            <p:childTnLst>
                               <p:par>
-                                <p:cTn id="11" presetID="2" presetClass="entr" presetSubtype="4" fill="hold" nodeType="clickEffect">
+                                <p:cTn id="9" presetID="2" presetClass="entr" presetSubtype="4" fill="hold" nodeType="withEffect">
                                   <p:stCondLst>
                                     <p:cond delay="0"/>
                                   </p:stCondLst>
                                   <p:childTnLst>
                                     <p:set>
                                       <p:cBhvr>
-                                        <p:cTn id="12" dur="1" fill="hold">
+                                        <p:cTn id="10" dur="1" fill="hold">
                                           <p:stCondLst>
                                             <p:cond delay="0"/>
                                           </p:stCondLst>
@@ -13824,7 +14471,7 @@
                                     </p:set>
                                     <p:anim calcmode="lin" valueType="num">
                                       <p:cBhvr additive="base">
-                                        <p:cTn id="13" dur="500" fill="hold"/>
+                                        <p:cTn id="11" dur="500" fill="hold"/>
                                         <p:tgtEl>
                                           <p:spTgt spid="6"/>
                                         </p:tgtEl>
@@ -13847,7 +14494,7 @@
                                     </p:anim>
                                     <p:anim calcmode="lin" valueType="num">
                                       <p:cBhvr additive="base">
-                                        <p:cTn id="14" dur="500" fill="hold"/>
+                                        <p:cTn id="12" dur="500" fill="hold"/>
                                         <p:tgtEl>
                                           <p:spTgt spid="6"/>
                                         </p:tgtEl>
@@ -13878,19 +14525,50 @@
                     </p:cTn>
                   </p:par>
                   <p:par>
-                    <p:cTn id="15" fill="hold">
+                    <p:cTn id="13" fill="hold">
                       <p:stCondLst>
                         <p:cond delay="indefinite"/>
                       </p:stCondLst>
                       <p:childTnLst>
                         <p:par>
-                          <p:cTn id="16" fill="hold">
+                          <p:cTn id="14" fill="hold">
                             <p:stCondLst>
                               <p:cond delay="0"/>
                             </p:stCondLst>
                             <p:childTnLst>
                               <p:par>
-                                <p:cTn id="17" presetID="1" presetClass="entr" presetSubtype="0" fill="hold" nodeType="clickEffect">
+                                <p:cTn id="15" presetID="1" presetClass="entr" presetSubtype="0" fill="hold" nodeType="clickEffect">
+                                  <p:stCondLst>
+                                    <p:cond delay="0"/>
+                                  </p:stCondLst>
+                                  <p:childTnLst>
+                                    <p:set>
+                                      <p:cBhvr>
+                                        <p:cTn id="16" dur="1" fill="hold">
+                                          <p:stCondLst>
+                                            <p:cond delay="0"/>
+                                          </p:stCondLst>
+                                        </p:cTn>
+                                        <p:tgtEl>
+                                          <p:spTgt spid="3">
+                                            <p:txEl>
+                                              <p:pRg st="2" end="2"/>
+                                            </p:txEl>
+                                          </p:spTgt>
+                                        </p:tgtEl>
+                                        <p:attrNameLst>
+                                          <p:attrName>style.visibility</p:attrName>
+                                        </p:attrNameLst>
+                                      </p:cBhvr>
+                                      <p:to>
+                                        <p:strVal val="visible"/>
+                                      </p:to>
+                                    </p:set>
+                                  </p:childTnLst>
+                                </p:cTn>
+                              </p:par>
+                              <p:par>
+                                <p:cTn id="17" presetID="1" presetClass="entr" presetSubtype="0" fill="hold" nodeType="withEffect">
                                   <p:stCondLst>
                                     <p:cond delay="0"/>
                                   </p:stCondLst>
@@ -13905,7 +14583,7 @@
                                         <p:tgtEl>
                                           <p:spTgt spid="3">
                                             <p:txEl>
-                                              <p:pRg st="2" end="2"/>
+                                              <p:pRg st="3" end="3"/>
                                             </p:txEl>
                                           </p:spTgt>
                                         </p:tgtEl>
@@ -13936,7 +14614,7 @@
                                         <p:tgtEl>
                                           <p:spTgt spid="3">
                                             <p:txEl>
-                                              <p:pRg st="3" end="3"/>
+                                              <p:pRg st="4" end="4"/>
                                             </p:txEl>
                                           </p:spTgt>
                                         </p:tgtEl>
@@ -13967,7 +14645,7 @@
                                         <p:tgtEl>
                                           <p:spTgt spid="3">
                                             <p:txEl>
-                                              <p:pRg st="4" end="4"/>
+                                              <p:pRg st="5" end="5"/>
                                             </p:txEl>
                                           </p:spTgt>
                                         </p:tgtEl>
@@ -13983,7 +14661,7 @@
                                 </p:cTn>
                               </p:par>
                               <p:par>
-                                <p:cTn id="23" presetID="1" presetClass="entr" presetSubtype="0" fill="hold" nodeType="withEffect">
+                                <p:cTn id="23" presetID="21" presetClass="entr" presetSubtype="1" fill="hold" nodeType="withEffect">
                                   <p:stCondLst>
                                     <p:cond delay="0"/>
                                   </p:stCondLst>
@@ -13991,55 +14669,6 @@
                                     <p:set>
                                       <p:cBhvr>
                                         <p:cTn id="24" dur="1" fill="hold">
-                                          <p:stCondLst>
-                                            <p:cond delay="0"/>
-                                          </p:stCondLst>
-                                        </p:cTn>
-                                        <p:tgtEl>
-                                          <p:spTgt spid="3">
-                                            <p:txEl>
-                                              <p:pRg st="5" end="5"/>
-                                            </p:txEl>
-                                          </p:spTgt>
-                                        </p:tgtEl>
-                                        <p:attrNameLst>
-                                          <p:attrName>style.visibility</p:attrName>
-                                        </p:attrNameLst>
-                                      </p:cBhvr>
-                                      <p:to>
-                                        <p:strVal val="visible"/>
-                                      </p:to>
-                                    </p:set>
-                                  </p:childTnLst>
-                                </p:cTn>
-                              </p:par>
-                            </p:childTnLst>
-                          </p:cTn>
-                        </p:par>
-                      </p:childTnLst>
-                    </p:cTn>
-                  </p:par>
-                  <p:par>
-                    <p:cTn id="25" fill="hold">
-                      <p:stCondLst>
-                        <p:cond delay="indefinite"/>
-                      </p:stCondLst>
-                      <p:childTnLst>
-                        <p:par>
-                          <p:cTn id="26" fill="hold">
-                            <p:stCondLst>
-                              <p:cond delay="0"/>
-                            </p:stCondLst>
-                            <p:childTnLst>
-                              <p:par>
-                                <p:cTn id="27" presetID="21" presetClass="entr" presetSubtype="1" fill="hold" nodeType="clickEffect">
-                                  <p:stCondLst>
-                                    <p:cond delay="0"/>
-                                  </p:stCondLst>
-                                  <p:childTnLst>
-                                    <p:set>
-                                      <p:cBhvr>
-                                        <p:cTn id="28" dur="1" fill="hold">
                                           <p:stCondLst>
                                             <p:cond delay="0"/>
                                           </p:stCondLst>
@@ -14057,7 +14686,7 @@
                                     </p:set>
                                     <p:animEffect transition="in" filter="wheel(1)">
                                       <p:cBhvr>
-                                        <p:cTn id="29" dur="2000"/>
+                                        <p:cTn id="25" dur="2000"/>
                                         <p:tgtEl>
                                           <p:spTgt spid="7"/>
                                         </p:tgtEl>
@@ -14066,33 +14695,15 @@
                                   </p:childTnLst>
                                 </p:cTn>
                               </p:par>
-                            </p:childTnLst>
-                          </p:cTn>
-                        </p:par>
-                      </p:childTnLst>
-                    </p:cTn>
-                  </p:par>
-                  <p:par>
-                    <p:cTn id="30" fill="hold">
-                      <p:stCondLst>
-                        <p:cond delay="indefinite"/>
-                      </p:stCondLst>
-                      <p:childTnLst>
-                        <p:par>
-                          <p:cTn id="31" fill="hold">
-                            <p:stCondLst>
-                              <p:cond delay="0"/>
-                            </p:stCondLst>
-                            <p:childTnLst>
                               <p:par>
-                                <p:cTn id="32" presetID="10" presetClass="entr" presetSubtype="0" fill="hold" nodeType="clickEffect">
+                                <p:cTn id="26" presetID="21" presetClass="entr" presetSubtype="4" fill="hold" nodeType="withEffect">
                                   <p:stCondLst>
                                     <p:cond delay="0"/>
                                   </p:stCondLst>
                                   <p:childTnLst>
                                     <p:set>
                                       <p:cBhvr>
-                                        <p:cTn id="33" dur="1" fill="hold">
+                                        <p:cTn id="27" dur="1" fill="hold">
                                           <p:stCondLst>
                                             <p:cond delay="0"/>
                                           </p:stCondLst>
@@ -14108,9 +14719,9 @@
                                         <p:strVal val="visible"/>
                                       </p:to>
                                     </p:set>
-                                    <p:animEffect transition="in" filter="fade">
+                                    <p:animEffect transition="in" filter="wheel(4)">
                                       <p:cBhvr>
-                                        <p:cTn id="34" dur="500"/>
+                                        <p:cTn id="28" dur="2000"/>
                                         <p:tgtEl>
                                           <p:spTgt spid="8"/>
                                         </p:tgtEl>
@@ -14288,7 +14899,7 @@
           <a:blip r:embed="rId2" cstate="print">
             <a:extLst>
               <a:ext uri="{28A0092B-C50C-407E-A947-70E740481C1C}">
-                <a14:useLocalDpi xmlns:a14="http://schemas.microsoft.com/office/drawing/2010/main" val="0"/>
+                <a14:useLocalDpi xmlns:a14="http://schemas.microsoft.com/office/drawing/2010/main" xmlns="" val="0"/>
               </a:ext>
             </a:extLst>
           </a:blip>
@@ -14318,7 +14929,7 @@
           <a:blip r:embed="rId3" cstate="print">
             <a:extLst>
               <a:ext uri="{28A0092B-C50C-407E-A947-70E740481C1C}">
-                <a14:useLocalDpi xmlns:a14="http://schemas.microsoft.com/office/drawing/2010/main" val="0"/>
+                <a14:useLocalDpi xmlns:a14="http://schemas.microsoft.com/office/drawing/2010/main" xmlns="" val="0"/>
               </a:ext>
             </a:extLst>
           </a:blip>
@@ -14363,7 +14974,7 @@
     </p:spTree>
     <p:extLst>
       <p:ext uri="{BB962C8B-B14F-4D97-AF65-F5344CB8AC3E}">
-        <p14:creationId xmlns:p14="http://schemas.microsoft.com/office/powerpoint/2010/main" val="1537339701"/>
+        <p14:creationId xmlns:p14="http://schemas.microsoft.com/office/powerpoint/2010/main" xmlns="" val="1537339701"/>
       </p:ext>
     </p:extLst>
   </p:cSld>
@@ -14509,7 +15120,7 @@
     </p:spTree>
     <p:extLst>
       <p:ext uri="{BB962C8B-B14F-4D97-AF65-F5344CB8AC3E}">
-        <p14:creationId xmlns:p14="http://schemas.microsoft.com/office/powerpoint/2010/main" val="4133172040"/>
+        <p14:creationId xmlns:p14="http://schemas.microsoft.com/office/powerpoint/2010/main" xmlns="" val="4133172040"/>
       </p:ext>
     </p:extLst>
   </p:cSld>
@@ -14684,7 +15295,7 @@
     </p:spTree>
     <p:extLst>
       <p:ext uri="{BB962C8B-B14F-4D97-AF65-F5344CB8AC3E}">
-        <p14:creationId xmlns:p14="http://schemas.microsoft.com/office/powerpoint/2010/main" val="432327544"/>
+        <p14:creationId xmlns:p14="http://schemas.microsoft.com/office/powerpoint/2010/main" xmlns="" val="432327544"/>
       </p:ext>
     </p:extLst>
   </p:cSld>
@@ -14703,6 +15314,9 @@
                     <p:cTn id="3" fill="hold">
                       <p:stCondLst>
                         <p:cond delay="indefinite"/>
+                        <p:cond evt="onBegin" delay="0">
+                          <p:tn val="2"/>
+                        </p:cond>
                       </p:stCondLst>
                       <p:childTnLst>
                         <p:par>
@@ -14712,7 +15326,7 @@
                             </p:stCondLst>
                             <p:childTnLst>
                               <p:par>
-                                <p:cTn id="5" presetID="10" presetClass="entr" presetSubtype="0" fill="hold" nodeType="clickEffect">
+                                <p:cTn id="5" presetID="21" presetClass="entr" presetSubtype="4" fill="hold" nodeType="withEffect">
                                   <p:stCondLst>
                                     <p:cond delay="0"/>
                                   </p:stCondLst>
@@ -14735,9 +15349,9 @@
                                         <p:strVal val="visible"/>
                                       </p:to>
                                     </p:set>
-                                    <p:animEffect transition="in" filter="fade">
+                                    <p:animEffect transition="in" filter="wheel(4)">
                                       <p:cBhvr>
-                                        <p:cTn id="7" dur="500"/>
+                                        <p:cTn id="7" dur="1000"/>
                                         <p:tgtEl>
                                           <p:spTgt spid="4"/>
                                         </p:tgtEl>
@@ -14747,7 +15361,7 @@
                                 </p:cTn>
                               </p:par>
                               <p:par>
-                                <p:cTn id="8" presetID="10" presetClass="entr" presetSubtype="0" fill="hold" nodeType="withEffect">
+                                <p:cTn id="8" presetID="21" presetClass="entr" presetSubtype="4" fill="hold" nodeType="withEffect">
                                   <p:stCondLst>
                                     <p:cond delay="0"/>
                                   </p:stCondLst>
@@ -14770,9 +15384,9 @@
                                         <p:strVal val="visible"/>
                                       </p:to>
                                     </p:set>
-                                    <p:animEffect transition="in" filter="fade">
+                                    <p:animEffect transition="in" filter="wheel(4)">
                                       <p:cBhvr>
-                                        <p:cTn id="10" dur="500"/>
+                                        <p:cTn id="10" dur="1000"/>
                                         <p:tgtEl>
                                           <p:spTgt spid="5"/>
                                         </p:tgtEl>
@@ -14781,33 +15395,15 @@
                                   </p:childTnLst>
                                 </p:cTn>
                               </p:par>
-                            </p:childTnLst>
-                          </p:cTn>
-                        </p:par>
-                      </p:childTnLst>
-                    </p:cTn>
-                  </p:par>
-                  <p:par>
-                    <p:cTn id="11" fill="hold">
-                      <p:stCondLst>
-                        <p:cond delay="indefinite"/>
-                      </p:stCondLst>
-                      <p:childTnLst>
-                        <p:par>
-                          <p:cTn id="12" fill="hold">
-                            <p:stCondLst>
-                              <p:cond delay="0"/>
-                            </p:stCondLst>
-                            <p:childTnLst>
                               <p:par>
-                                <p:cTn id="13" presetID="10" presetClass="entr" presetSubtype="0" fill="hold" nodeType="clickEffect">
+                                <p:cTn id="11" presetID="21" presetClass="entr" presetSubtype="4" fill="hold" nodeType="withEffect">
                                   <p:stCondLst>
                                     <p:cond delay="0"/>
                                   </p:stCondLst>
                                   <p:childTnLst>
                                     <p:set>
                                       <p:cBhvr>
-                                        <p:cTn id="14" dur="1" fill="hold">
+                                        <p:cTn id="12" dur="1" fill="hold">
                                           <p:stCondLst>
                                             <p:cond delay="0"/>
                                           </p:stCondLst>
@@ -14823,9 +15419,9 @@
                                         <p:strVal val="visible"/>
                                       </p:to>
                                     </p:set>
-                                    <p:animEffect transition="in" filter="fade">
+                                    <p:animEffect transition="in" filter="wheel(4)">
                                       <p:cBhvr>
-                                        <p:cTn id="15" dur="500"/>
+                                        <p:cTn id="13" dur="1000"/>
                                         <p:tgtEl>
                                           <p:spTgt spid="7"/>
                                         </p:tgtEl>
@@ -14835,14 +15431,14 @@
                                 </p:cTn>
                               </p:par>
                               <p:par>
-                                <p:cTn id="16" presetID="10" presetClass="entr" presetSubtype="0" fill="hold" nodeType="withEffect">
+                                <p:cTn id="14" presetID="21" presetClass="entr" presetSubtype="4" fill="hold" nodeType="withEffect">
                                   <p:stCondLst>
                                     <p:cond delay="0"/>
                                   </p:stCondLst>
                                   <p:childTnLst>
                                     <p:set>
                                       <p:cBhvr>
-                                        <p:cTn id="17" dur="1" fill="hold">
+                                        <p:cTn id="15" dur="1" fill="hold">
                                           <p:stCondLst>
                                             <p:cond delay="0"/>
                                           </p:stCondLst>
@@ -14858,9 +15454,9 @@
                                         <p:strVal val="visible"/>
                                       </p:to>
                                     </p:set>
-                                    <p:animEffect transition="in" filter="fade">
+                                    <p:animEffect transition="in" filter="wheel(4)">
                                       <p:cBhvr>
-                                        <p:cTn id="18" dur="500"/>
+                                        <p:cTn id="16" dur="1000"/>
                                         <p:tgtEl>
                                           <p:spTgt spid="6"/>
                                         </p:tgtEl>
@@ -14970,7 +15566,7 @@
       </p:sp>
       <p:pic>
         <p:nvPicPr>
-          <p:cNvPr id="5" name="Picture 4"/>
+          <p:cNvPr id="8" name="תמונה 7" descr="עליון 2.PNG"/>
           <p:cNvPicPr>
             <a:picLocks noChangeAspect="1"/>
           </p:cNvPicPr>
@@ -14984,8 +15580,8 @@
         </p:blipFill>
         <p:spPr>
           <a:xfrm>
-            <a:off x="1888338" y="2270002"/>
-            <a:ext cx="6318114" cy="1866918"/>
+            <a:off x="1202744" y="2348286"/>
+            <a:ext cx="7687748" cy="2276793"/>
           </a:xfrm>
           <a:prstGeom prst="rect">
             <a:avLst/>
@@ -14994,7 +15590,7 @@
       </p:pic>
       <p:pic>
         <p:nvPicPr>
-          <p:cNvPr id="6" name="Picture 5"/>
+          <p:cNvPr id="9" name="תמונה 8" descr="תחתון 2.PNG"/>
           <p:cNvPicPr>
             <a:picLocks noChangeAspect="1"/>
           </p:cNvPicPr>
@@ -15008,8 +15604,8 @@
         </p:blipFill>
         <p:spPr>
           <a:xfrm>
-            <a:off x="1066800" y="4284659"/>
-            <a:ext cx="8233669" cy="2014484"/>
+            <a:off x="1197429" y="4584994"/>
+            <a:ext cx="7689667" cy="990738"/>
           </a:xfrm>
           <a:prstGeom prst="rect">
             <a:avLst/>
@@ -15019,7 +15615,7 @@
     </p:spTree>
     <p:extLst>
       <p:ext uri="{BB962C8B-B14F-4D97-AF65-F5344CB8AC3E}">
-        <p14:creationId xmlns:p14="http://schemas.microsoft.com/office/powerpoint/2010/main" val="3204925983"/>
+        <p14:creationId xmlns:p14="http://schemas.microsoft.com/office/powerpoint/2010/main" xmlns="" val="3204925983"/>
       </p:ext>
     </p:extLst>
   </p:cSld>
@@ -15311,7 +15907,7 @@
   <a:extraClrSchemeLst/>
   <a:extLst>
     <a:ext uri="{05A4C25C-085E-4340-85A3-A5531E510DB2}">
-      <thm15:themeFamily xmlns:thm15="http://schemas.microsoft.com/office/thememl/2012/main" name="Savon" id="{1306E473-ED32-493B-A2D0-240A757EDD34}" vid="{C20BADFE-D095-436F-9677-9264042809F0}"/>
+      <thm15:themeFamily xmlns:thm15="http://schemas.microsoft.com/office/thememl/2012/main" xmlns="" name="Savon" id="{1306E473-ED32-493B-A2D0-240A757EDD34}" vid="{C20BADFE-D095-436F-9677-9264042809F0}"/>
     </a:ext>
   </a:extLst>
 </a:theme>

</xml_diff>